<commit_message>
v2 test frame groups
</commit_message>
<xml_diff>
--- a/Slides/layout.pptx
+++ b/Slides/layout.pptx
@@ -5,11 +5,19 @@
     <p:sldMasterId id="2147483648" r:id="rId1"/>
   </p:sldMasterIdLst>
   <p:notesMasterIdLst>
-    <p:notesMasterId r:id="rId4"/>
+    <p:notesMasterId r:id="rId12"/>
   </p:notesMasterIdLst>
   <p:sldIdLst>
-    <p:sldId id="257" r:id="rId2"/>
-    <p:sldId id="256" r:id="rId3"/>
+    <p:sldId id="262" r:id="rId2"/>
+    <p:sldId id="265" r:id="rId3"/>
+    <p:sldId id="263" r:id="rId4"/>
+    <p:sldId id="264" r:id="rId5"/>
+    <p:sldId id="258" r:id="rId6"/>
+    <p:sldId id="257" r:id="rId7"/>
+    <p:sldId id="260" r:id="rId8"/>
+    <p:sldId id="259" r:id="rId9"/>
+    <p:sldId id="256" r:id="rId10"/>
+    <p:sldId id="261" r:id="rId11"/>
   </p:sldIdLst>
   <p:sldSz cx="12192000" cy="6858000"/>
   <p:notesSz cx="6858000" cy="9144000"/>
@@ -111,17 +119,12 @@
   <p:extLst>
     <p:ext uri="{EFAFB233-063F-42B5-8137-9DF3F51BA10A}">
       <p15:sldGuideLst xmlns:p15="http://schemas.microsoft.com/office/powerpoint/2012/main">
-        <p15:guide id="1" orient="horz" pos="1920" userDrawn="1">
+        <p15:guide id="1" orient="horz" userDrawn="1">
           <p15:clr>
             <a:srgbClr val="A4A3A4"/>
           </p15:clr>
         </p15:guide>
-        <p15:guide id="2" pos="1728" userDrawn="1">
-          <p15:clr>
-            <a:srgbClr val="A4A3A4"/>
-          </p15:clr>
-        </p15:guide>
-        <p15:guide id="3" orient="horz" pos="2760" userDrawn="1">
+        <p15:guide id="2" pos="3480" userDrawn="1">
           <p15:clr>
             <a:srgbClr val="A4A3A4"/>
           </p15:clr>
@@ -214,7 +217,7 @@
           <a:p>
             <a:fld id="{43C865E1-4CD8-1646-AD3B-38D4F18BEC9D}" type="datetimeFigureOut">
               <a:rPr lang="en-US" smtClean="0"/>
-              <a:t>2/1/24</a:t>
+              <a:t>2/19/24</a:t>
             </a:fld>
             <a:endParaRPr lang="en-US"/>
           </a:p>
@@ -572,7 +575,7 @@
           <a:p>
             <a:r>
               <a:rPr lang="en-US" dirty="0"/>
-              <a:t>Heigh: 4.5/7.5 = 60</a:t>
+              <a:t>Height: 4.5/7.5 = 60</a:t>
             </a:r>
           </a:p>
           <a:p>
@@ -655,7 +658,7 @@
           <a:p>
             <a:fld id="{33A6F4BA-D916-1F4A-A36F-1BFB60425551}" type="slidenum">
               <a:rPr lang="en-US" smtClean="0"/>
-              <a:t>1</a:t>
+              <a:t>3</a:t>
             </a:fld>
             <a:endParaRPr lang="en-US"/>
           </a:p>
@@ -664,7 +667,7 @@
     </p:spTree>
     <p:extLst>
       <p:ext uri="{BB962C8B-B14F-4D97-AF65-F5344CB8AC3E}">
-        <p14:creationId xmlns:p14="http://schemas.microsoft.com/office/powerpoint/2010/main" val="2906353728"/>
+        <p14:creationId xmlns:p14="http://schemas.microsoft.com/office/powerpoint/2010/main" val="2596091891"/>
       </p:ext>
     </p:extLst>
   </p:cSld>
@@ -720,6 +723,270 @@
           <a:p>
             <a:r>
               <a:rPr lang="en-US" dirty="0"/>
+              <a:t>Picture</a:t>
+            </a:r>
+          </a:p>
+          <a:p>
+            <a:r>
+              <a:rPr lang="en-US" dirty="0"/>
+              <a:t>Height: 4.5/7.5 = 60</a:t>
+            </a:r>
+          </a:p>
+          <a:p>
+            <a:r>
+              <a:rPr lang="en-US" dirty="0"/>
+              <a:t>Top: 1.25/7.5 = 16.67</a:t>
+            </a:r>
+          </a:p>
+          <a:p>
+            <a:r>
+              <a:rPr lang="en-US" dirty="0"/>
+              <a:t>Left: .88/13.33 = 6.60</a:t>
+            </a:r>
+          </a:p>
+          <a:p>
+            <a:endParaRPr lang="en-US" dirty="0"/>
+          </a:p>
+          <a:p>
+            <a:r>
+              <a:rPr lang="en-US" dirty="0"/>
+              <a:t>Outcome</a:t>
+            </a:r>
+          </a:p>
+          <a:p>
+            <a:r>
+              <a:rPr lang="en-US" dirty="0"/>
+              <a:t>Height: 4.5/7.5 = 60</a:t>
+            </a:r>
+          </a:p>
+          <a:p>
+            <a:r>
+              <a:rPr lang="en-US" dirty="0"/>
+              <a:t>Top: 1.25/7.5 = 16.67</a:t>
+            </a:r>
+          </a:p>
+          <a:p>
+            <a:r>
+              <a:rPr lang="en-US" dirty="0"/>
+              <a:t>Left: 61.55</a:t>
+            </a:r>
+          </a:p>
+          <a:p>
+            <a:endParaRPr lang="en-US" dirty="0"/>
+          </a:p>
+          <a:p>
+            <a:r>
+              <a:rPr lang="en-US" dirty="0"/>
+              <a:t>Arrow</a:t>
+            </a:r>
+          </a:p>
+          <a:p>
+            <a:r>
+              <a:rPr lang="en-US" dirty="0"/>
+              <a:t>Height: 1/7.5 = 13.33</a:t>
+            </a:r>
+          </a:p>
+          <a:p>
+            <a:r>
+              <a:rPr lang="en-US" dirty="0"/>
+              <a:t>Top: 3.25/7.5 = 43.33</a:t>
+            </a:r>
+          </a:p>
+          <a:p>
+            <a:r>
+              <a:rPr lang="en-US" dirty="0"/>
+              <a:t>Left: 45.28</a:t>
+            </a:r>
+          </a:p>
+          <a:p>
+            <a:endParaRPr lang="en-US" dirty="0"/>
+          </a:p>
+        </p:txBody>
+      </p:sp>
+      <p:sp>
+        <p:nvSpPr>
+          <p:cNvPr id="4" name="Slide Number Placeholder 3"/>
+          <p:cNvSpPr>
+            <a:spLocks noGrp="1"/>
+          </p:cNvSpPr>
+          <p:nvPr>
+            <p:ph type="sldNum" sz="quarter" idx="5"/>
+          </p:nvPr>
+        </p:nvSpPr>
+        <p:spPr/>
+        <p:txBody>
+          <a:bodyPr/>
+          <a:lstStyle/>
+          <a:p>
+            <a:fld id="{33A6F4BA-D916-1F4A-A36F-1BFB60425551}" type="slidenum">
+              <a:rPr lang="en-US" smtClean="0"/>
+              <a:t>4</a:t>
+            </a:fld>
+            <a:endParaRPr lang="en-US"/>
+          </a:p>
+        </p:txBody>
+      </p:sp>
+    </p:spTree>
+    <p:extLst>
+      <p:ext uri="{BB962C8B-B14F-4D97-AF65-F5344CB8AC3E}">
+        <p14:creationId xmlns:p14="http://schemas.microsoft.com/office/powerpoint/2010/main" val="480591277"/>
+      </p:ext>
+    </p:extLst>
+  </p:cSld>
+  <p:clrMapOvr>
+    <a:masterClrMapping/>
+  </p:clrMapOvr>
+</p:notes>
+</file>
+
+<file path=ppt/notesSlides/notesSlide3.xml><?xml version="1.0" encoding="utf-8"?>
+<p:notes xmlns:a="http://schemas.openxmlformats.org/drawingml/2006/main" xmlns:r="http://schemas.openxmlformats.org/officeDocument/2006/relationships" xmlns:p="http://schemas.openxmlformats.org/presentationml/2006/main">
+  <p:cSld>
+    <p:spTree>
+      <p:nvGrpSpPr>
+        <p:cNvPr id="1" name=""/>
+        <p:cNvGrpSpPr/>
+        <p:nvPr/>
+      </p:nvGrpSpPr>
+      <p:grpSpPr>
+        <a:xfrm>
+          <a:off x="0" y="0"/>
+          <a:ext cx="0" cy="0"/>
+          <a:chOff x="0" y="0"/>
+          <a:chExt cx="0" cy="0"/>
+        </a:xfrm>
+      </p:grpSpPr>
+      <p:sp>
+        <p:nvSpPr>
+          <p:cNvPr id="2" name="Slide Image Placeholder 1"/>
+          <p:cNvSpPr>
+            <a:spLocks noGrp="1" noRot="1" noChangeAspect="1"/>
+          </p:cNvSpPr>
+          <p:nvPr>
+            <p:ph type="sldImg"/>
+          </p:nvPr>
+        </p:nvSpPr>
+        <p:spPr/>
+      </p:sp>
+      <p:sp>
+        <p:nvSpPr>
+          <p:cNvPr id="3" name="Notes Placeholder 2"/>
+          <p:cNvSpPr>
+            <a:spLocks noGrp="1"/>
+          </p:cNvSpPr>
+          <p:nvPr>
+            <p:ph type="body" idx="1"/>
+          </p:nvPr>
+        </p:nvSpPr>
+        <p:spPr/>
+        <p:txBody>
+          <a:bodyPr/>
+          <a:lstStyle/>
+          <a:p>
+            <a:endParaRPr lang="en-US" dirty="0"/>
+          </a:p>
+        </p:txBody>
+      </p:sp>
+      <p:sp>
+        <p:nvSpPr>
+          <p:cNvPr id="4" name="Slide Number Placeholder 3"/>
+          <p:cNvSpPr>
+            <a:spLocks noGrp="1"/>
+          </p:cNvSpPr>
+          <p:nvPr>
+            <p:ph type="sldNum" sz="quarter" idx="5"/>
+          </p:nvPr>
+        </p:nvSpPr>
+        <p:spPr/>
+        <p:txBody>
+          <a:bodyPr/>
+          <a:lstStyle/>
+          <a:p>
+            <a:fld id="{33A6F4BA-D916-1F4A-A36F-1BFB60425551}" type="slidenum">
+              <a:rPr lang="en-US" smtClean="0"/>
+              <a:t>5</a:t>
+            </a:fld>
+            <a:endParaRPr lang="en-US"/>
+          </a:p>
+        </p:txBody>
+      </p:sp>
+    </p:spTree>
+    <p:extLst>
+      <p:ext uri="{BB962C8B-B14F-4D97-AF65-F5344CB8AC3E}">
+        <p14:creationId xmlns:p14="http://schemas.microsoft.com/office/powerpoint/2010/main" val="728556175"/>
+      </p:ext>
+    </p:extLst>
+  </p:cSld>
+  <p:clrMapOvr>
+    <a:masterClrMapping/>
+  </p:clrMapOvr>
+</p:notes>
+</file>
+
+<file path=ppt/notesSlides/notesSlide4.xml><?xml version="1.0" encoding="utf-8"?>
+<p:notes xmlns:a="http://schemas.openxmlformats.org/drawingml/2006/main" xmlns:r="http://schemas.openxmlformats.org/officeDocument/2006/relationships" xmlns:p="http://schemas.openxmlformats.org/presentationml/2006/main">
+  <p:cSld>
+    <p:spTree>
+      <p:nvGrpSpPr>
+        <p:cNvPr id="1" name="">
+          <a:extLst>
+            <a:ext uri="{FF2B5EF4-FFF2-40B4-BE49-F238E27FC236}">
+              <a16:creationId xmlns:a16="http://schemas.microsoft.com/office/drawing/2014/main" id="{5524E0FA-AAA8-98CC-7C91-096377F3C762}"/>
+            </a:ext>
+          </a:extLst>
+        </p:cNvPr>
+        <p:cNvGrpSpPr/>
+        <p:nvPr/>
+      </p:nvGrpSpPr>
+      <p:grpSpPr>
+        <a:xfrm>
+          <a:off x="0" y="0"/>
+          <a:ext cx="0" cy="0"/>
+          <a:chOff x="0" y="0"/>
+          <a:chExt cx="0" cy="0"/>
+        </a:xfrm>
+      </p:grpSpPr>
+      <p:sp>
+        <p:nvSpPr>
+          <p:cNvPr id="2" name="Slide Image Placeholder 1">
+            <a:extLst>
+              <a:ext uri="{FF2B5EF4-FFF2-40B4-BE49-F238E27FC236}">
+                <a16:creationId xmlns:a16="http://schemas.microsoft.com/office/drawing/2014/main" id="{712951E8-AE39-2A67-8432-B7C8978EEF3B}"/>
+              </a:ext>
+            </a:extLst>
+          </p:cNvPr>
+          <p:cNvSpPr>
+            <a:spLocks noGrp="1" noRot="1" noChangeAspect="1"/>
+          </p:cNvSpPr>
+          <p:nvPr>
+            <p:ph type="sldImg"/>
+          </p:nvPr>
+        </p:nvSpPr>
+        <p:spPr/>
+      </p:sp>
+      <p:sp>
+        <p:nvSpPr>
+          <p:cNvPr id="3" name="Notes Placeholder 2">
+            <a:extLst>
+              <a:ext uri="{FF2B5EF4-FFF2-40B4-BE49-F238E27FC236}">
+                <a16:creationId xmlns:a16="http://schemas.microsoft.com/office/drawing/2014/main" id="{B1537F90-CDC5-97AE-F65C-2E8074C9FD02}"/>
+              </a:ext>
+            </a:extLst>
+          </p:cNvPr>
+          <p:cNvSpPr>
+            <a:spLocks noGrp="1"/>
+          </p:cNvSpPr>
+          <p:nvPr>
+            <p:ph type="body" idx="1"/>
+          </p:nvPr>
+        </p:nvSpPr>
+        <p:spPr/>
+        <p:txBody>
+          <a:bodyPr/>
+          <a:lstStyle/>
+          <a:p>
+            <a:r>
+              <a:rPr lang="en-US" dirty="0"/>
               <a:t>13.33  by 7.5</a:t>
             </a:r>
           </a:p>
@@ -729,181 +996,68 @@
           <a:p>
             <a:r>
               <a:rPr lang="en-US" dirty="0"/>
-              <a:t>Left: (6.67-6.33)/13.33 = 2.5%</a:t>
+              <a:t>Picture</a:t>
             </a:r>
           </a:p>
           <a:p>
             <a:r>
               <a:rPr lang="en-US" dirty="0"/>
-              <a:t>Top: (3.75-2.79)/7.5 = 12.8%</a:t>
-            </a:r>
-          </a:p>
-          <a:p>
-            <a:pPr marL="0" marR="0" lvl="0" indent="0" algn="l" defTabSz="914400" rtl="0" eaLnBrk="1" fontAlgn="auto" latinLnBrk="0" hangingPunct="1">
-              <a:lnSpc>
-                <a:spcPct val="100000"/>
-              </a:lnSpc>
-              <a:spcBef>
-                <a:spcPts val="0"/>
-              </a:spcBef>
-              <a:spcAft>
-                <a:spcPts val="0"/>
-              </a:spcAft>
-              <a:buClrTx/>
-              <a:buSzTx/>
-              <a:buFontTx/>
-              <a:buNone/>
-              <a:tabLst/>
-              <a:defRPr/>
-            </a:pPr>
-            <a:r>
-              <a:rPr lang="en-US" dirty="0">
-                <a:sym typeface="Wingdings" pitchFamily="2" charset="2"/>
-              </a:rPr>
-              <a:t>Width: 5.56/13.33 = 42%</a:t>
+              <a:t>Top: 0</a:t>
+            </a:r>
+          </a:p>
+          <a:p>
+            <a:r>
+              <a:rPr lang="en-US" dirty="0"/>
+              <a:t>Left: (6.67-2.25)/7.5 = 33.13</a:t>
+            </a:r>
+          </a:p>
+          <a:p>
+            <a:r>
+              <a:rPr lang="en-US" dirty="0"/>
+              <a:t>Height: 4.5/7.5 = 60</a:t>
             </a:r>
           </a:p>
           <a:p>
             <a:endParaRPr lang="en-US" dirty="0"/>
           </a:p>
           <a:p>
+            <a:r>
+              <a:rPr lang="en-US" dirty="0"/>
+              <a:t>Buttons:</a:t>
+            </a:r>
+          </a:p>
+          <a:p>
+            <a:r>
+              <a:rPr lang="en-US" dirty="0"/>
+              <a:t>Top: 4.75/7.5 = 63.3</a:t>
+            </a:r>
+          </a:p>
+          <a:p>
+            <a:r>
+              <a:rPr lang="en-US" dirty="0"/>
+              <a:t>Width: 2/13.33 = 15</a:t>
+            </a:r>
+          </a:p>
+          <a:p>
             <a:endParaRPr lang="en-US" dirty="0"/>
           </a:p>
           <a:p>
             <a:r>
               <a:rPr lang="en-US" dirty="0"/>
-              <a:t>Left</a:t>
-            </a:r>
-            <a:r>
-              <a:rPr lang="en-US" dirty="0">
-                <a:sym typeface="Wingdings" pitchFamily="2" charset="2"/>
-              </a:rPr>
-              <a:t>: (6.67+0.83)/13.33 = 56%</a:t>
-            </a:r>
-          </a:p>
-          <a:p>
-            <a:r>
-              <a:rPr lang="en-US" dirty="0">
-                <a:sym typeface="Wingdings" pitchFamily="2" charset="2"/>
-              </a:rPr>
-              <a:t>Top: 0%</a:t>
-            </a:r>
-          </a:p>
-          <a:p>
-            <a:r>
-              <a:rPr lang="en-US" dirty="0">
-                <a:sym typeface="Wingdings" pitchFamily="2" charset="2"/>
-              </a:rPr>
-              <a:t>Width: 2.6/13.33 = 1</a:t>
-            </a:r>
-            <a:r>
-              <a:rPr lang="en-US" i="1" dirty="0">
-                <a:sym typeface="Wingdings" pitchFamily="2" charset="2"/>
-              </a:rPr>
-              <a:t>9.5%</a:t>
-            </a:r>
-            <a:endParaRPr lang="en-US" dirty="0">
-              <a:sym typeface="Wingdings" pitchFamily="2" charset="2"/>
-            </a:endParaRPr>
-          </a:p>
-          <a:p>
-            <a:endParaRPr lang="en-US" dirty="0">
-              <a:sym typeface="Wingdings" pitchFamily="2" charset="2"/>
-            </a:endParaRPr>
-          </a:p>
-          <a:p>
-            <a:r>
-              <a:rPr lang="en-US" dirty="0">
-                <a:sym typeface="Wingdings" pitchFamily="2" charset="2"/>
-              </a:rPr>
-              <a:t>Left: (6.67+3.83)/13.33 = 79%</a:t>
-            </a:r>
-          </a:p>
-          <a:p>
-            <a:r>
-              <a:rPr lang="en-US" dirty="0">
-                <a:sym typeface="Wingdings" pitchFamily="2" charset="2"/>
-              </a:rPr>
-              <a:t>Top: 0%</a:t>
-            </a:r>
-          </a:p>
-          <a:p>
-            <a:pPr marL="0" marR="0" lvl="0" indent="0" algn="l" defTabSz="914400" rtl="0" eaLnBrk="1" fontAlgn="auto" latinLnBrk="0" hangingPunct="1">
-              <a:lnSpc>
-                <a:spcPct val="100000"/>
-              </a:lnSpc>
-              <a:spcBef>
-                <a:spcPts val="0"/>
-              </a:spcBef>
-              <a:spcAft>
-                <a:spcPts val="0"/>
-              </a:spcAft>
-              <a:buClrTx/>
-              <a:buSzTx/>
-              <a:buFontTx/>
-              <a:buNone/>
-              <a:tabLst/>
-              <a:defRPr/>
-            </a:pPr>
-            <a:r>
-              <a:rPr lang="en-US" dirty="0">
-                <a:sym typeface="Wingdings" pitchFamily="2" charset="2"/>
-              </a:rPr>
-              <a:t>Width: 2.6/13.33 = 1</a:t>
-            </a:r>
-            <a:r>
-              <a:rPr lang="en-US" i="1" dirty="0">
-                <a:sym typeface="Wingdings" pitchFamily="2" charset="2"/>
-              </a:rPr>
-              <a:t>9.5%</a:t>
-            </a:r>
-            <a:endParaRPr lang="en-US" dirty="0">
-              <a:sym typeface="Wingdings" pitchFamily="2" charset="2"/>
-            </a:endParaRPr>
-          </a:p>
-          <a:p>
-            <a:endParaRPr lang="en-US" dirty="0">
-              <a:sym typeface="Wingdings" pitchFamily="2" charset="2"/>
-            </a:endParaRPr>
-          </a:p>
-          <a:p>
-            <a:endParaRPr lang="en-US" dirty="0">
-              <a:sym typeface="Wingdings" pitchFamily="2" charset="2"/>
-            </a:endParaRPr>
-          </a:p>
-          <a:p>
-            <a:pPr marL="0" marR="0" lvl="0" indent="0" algn="l" defTabSz="914400" rtl="0" eaLnBrk="1" fontAlgn="auto" latinLnBrk="0" hangingPunct="1">
-              <a:lnSpc>
-                <a:spcPct val="100000"/>
-              </a:lnSpc>
-              <a:spcBef>
-                <a:spcPts val="0"/>
-              </a:spcBef>
-              <a:spcAft>
-                <a:spcPts val="0"/>
-              </a:spcAft>
-              <a:buClrTx/>
-              <a:buSzTx/>
-              <a:buFontTx/>
-              <a:buNone/>
-              <a:tabLst/>
-              <a:defRPr/>
-            </a:pPr>
-            <a:r>
-              <a:rPr lang="en-US" dirty="0">
-                <a:sym typeface="Wingdings" pitchFamily="2" charset="2"/>
-              </a:rPr>
-              <a:t>Left: (6.67+0.83)/13.33 = 56%</a:t>
+              <a:t>Left: 14</a:t>
             </a:r>
           </a:p>
           <a:p>
             <a:r>
               <a:rPr lang="en-US" dirty="0"/>
-              <a:t>Top: 50%</a:t>
-            </a:r>
-          </a:p>
-          <a:p>
-            <a:endParaRPr lang="en-US" dirty="0"/>
+              <a:t>Left: 33</a:t>
+            </a:r>
+          </a:p>
+          <a:p>
+            <a:r>
+              <a:rPr lang="en-US" dirty="0"/>
+              <a:t>Left: 52</a:t>
+            </a:r>
           </a:p>
           <a:p>
             <a:r>
@@ -911,80 +1065,24 @@
               <a:t>Left: </a:t>
             </a:r>
             <a:r>
-              <a:rPr lang="en-US" dirty="0">
-                <a:sym typeface="Wingdings" pitchFamily="2" charset="2"/>
-              </a:rPr>
-              <a:t>(6.67+3.83)/13.33 =  79%</a:t>
-            </a:r>
-          </a:p>
-          <a:p>
-            <a:pPr marL="0" marR="0" lvl="0" indent="0" algn="l" defTabSz="914400" rtl="0" eaLnBrk="1" fontAlgn="auto" latinLnBrk="0" hangingPunct="1">
-              <a:lnSpc>
-                <a:spcPct val="100000"/>
-              </a:lnSpc>
-              <a:spcBef>
-                <a:spcPts val="0"/>
-              </a:spcBef>
-              <a:spcAft>
-                <a:spcPts val="0"/>
-              </a:spcAft>
-              <a:buClrTx/>
-              <a:buSzTx/>
-              <a:buFontTx/>
-              <a:buNone/>
-              <a:tabLst/>
-              <a:defRPr/>
-            </a:pPr>
-            <a:r>
-              <a:rPr lang="en-US" dirty="0">
-                <a:sym typeface="Wingdings" pitchFamily="2" charset="2"/>
-              </a:rPr>
-              <a:t>Top: </a:t>
-            </a:r>
-            <a:r>
-              <a:rPr lang="en-US" dirty="0"/>
-              <a:t>50%</a:t>
+              <a:rPr lang="en-US" b="0" dirty="0"/>
+              <a:t>71</a:t>
             </a:r>
           </a:p>
           <a:p>
             <a:endParaRPr lang="en-US" dirty="0"/>
           </a:p>
-          <a:p>
-            <a:endParaRPr lang="en-US" dirty="0"/>
-          </a:p>
-          <a:p>
-            <a:r>
-              <a:rPr lang="en-US" dirty="0"/>
-              <a:t>Arrow</a:t>
-            </a:r>
-          </a:p>
-          <a:p>
-            <a:r>
-              <a:rPr lang="en-US" dirty="0"/>
-              <a:t>Left</a:t>
-            </a:r>
-            <a:r>
-              <a:rPr lang="en-US" b="0" dirty="0"/>
-              <a:t>: (6.67-.5)/13.33 = 46.3%</a:t>
-            </a:r>
-          </a:p>
-          <a:p>
-            <a:r>
-              <a:rPr lang="en-US" b="0" dirty="0"/>
-              <a:t>Top: (3.75-.42)/7.5 = 44.4%</a:t>
-            </a:r>
-          </a:p>
-          <a:p>
-            <a:r>
-              <a:rPr lang="en-US" b="0" dirty="0"/>
-              <a:t>Width: (.46+.71)/13.33 = 8.8%</a:t>
-            </a:r>
-          </a:p>
-        </p:txBody>
-      </p:sp>
-      <p:sp>
-        <p:nvSpPr>
-          <p:cNvPr id="4" name="Slide Number Placeholder 3"/>
+        </p:txBody>
+      </p:sp>
+      <p:sp>
+        <p:nvSpPr>
+          <p:cNvPr id="4" name="Slide Number Placeholder 3">
+            <a:extLst>
+              <a:ext uri="{FF2B5EF4-FFF2-40B4-BE49-F238E27FC236}">
+                <a16:creationId xmlns:a16="http://schemas.microsoft.com/office/drawing/2014/main" id="{F65D1E31-D14C-95B2-E5B4-86B08B2391B1}"/>
+              </a:ext>
+            </a:extLst>
+          </p:cNvPr>
           <p:cNvSpPr>
             <a:spLocks noGrp="1"/>
           </p:cNvSpPr>
@@ -999,7 +1097,259 @@
           <a:p>
             <a:fld id="{33A6F4BA-D916-1F4A-A36F-1BFB60425551}" type="slidenum">
               <a:rPr lang="en-US" smtClean="0"/>
-              <a:t>2</a:t>
+              <a:t>6</a:t>
+            </a:fld>
+            <a:endParaRPr lang="en-US"/>
+          </a:p>
+        </p:txBody>
+      </p:sp>
+    </p:spTree>
+    <p:extLst>
+      <p:ext uri="{BB962C8B-B14F-4D97-AF65-F5344CB8AC3E}">
+        <p14:creationId xmlns:p14="http://schemas.microsoft.com/office/powerpoint/2010/main" val="2906353728"/>
+      </p:ext>
+    </p:extLst>
+  </p:cSld>
+  <p:clrMapOvr>
+    <a:masterClrMapping/>
+  </p:clrMapOvr>
+</p:notes>
+</file>
+
+<file path=ppt/notesSlides/notesSlide5.xml><?xml version="1.0" encoding="utf-8"?>
+<p:notes xmlns:a="http://schemas.openxmlformats.org/drawingml/2006/main" xmlns:r="http://schemas.openxmlformats.org/officeDocument/2006/relationships" xmlns:p="http://schemas.openxmlformats.org/presentationml/2006/main">
+  <p:cSld>
+    <p:spTree>
+      <p:nvGrpSpPr>
+        <p:cNvPr id="1" name=""/>
+        <p:cNvGrpSpPr/>
+        <p:nvPr/>
+      </p:nvGrpSpPr>
+      <p:grpSpPr>
+        <a:xfrm>
+          <a:off x="0" y="0"/>
+          <a:ext cx="0" cy="0"/>
+          <a:chOff x="0" y="0"/>
+          <a:chExt cx="0" cy="0"/>
+        </a:xfrm>
+      </p:grpSpPr>
+      <p:sp>
+        <p:nvSpPr>
+          <p:cNvPr id="2" name="Slide Image Placeholder 1"/>
+          <p:cNvSpPr>
+            <a:spLocks noGrp="1" noRot="1" noChangeAspect="1"/>
+          </p:cNvSpPr>
+          <p:nvPr>
+            <p:ph type="sldImg"/>
+          </p:nvPr>
+        </p:nvSpPr>
+        <p:spPr/>
+      </p:sp>
+      <p:sp>
+        <p:nvSpPr>
+          <p:cNvPr id="3" name="Notes Placeholder 2"/>
+          <p:cNvSpPr>
+            <a:spLocks noGrp="1"/>
+          </p:cNvSpPr>
+          <p:nvPr>
+            <p:ph type="body" idx="1"/>
+          </p:nvPr>
+        </p:nvSpPr>
+        <p:spPr/>
+        <p:txBody>
+          <a:bodyPr/>
+          <a:lstStyle/>
+          <a:p>
+            <a:endParaRPr lang="en-US" dirty="0"/>
+          </a:p>
+        </p:txBody>
+      </p:sp>
+      <p:sp>
+        <p:nvSpPr>
+          <p:cNvPr id="4" name="Slide Number Placeholder 3"/>
+          <p:cNvSpPr>
+            <a:spLocks noGrp="1"/>
+          </p:cNvSpPr>
+          <p:nvPr>
+            <p:ph type="sldNum" sz="quarter" idx="5"/>
+          </p:nvPr>
+        </p:nvSpPr>
+        <p:spPr/>
+        <p:txBody>
+          <a:bodyPr/>
+          <a:lstStyle/>
+          <a:p>
+            <a:fld id="{33A6F4BA-D916-1F4A-A36F-1BFB60425551}" type="slidenum">
+              <a:rPr lang="en-US" smtClean="0"/>
+              <a:t>7</a:t>
+            </a:fld>
+            <a:endParaRPr lang="en-US"/>
+          </a:p>
+        </p:txBody>
+      </p:sp>
+    </p:spTree>
+    <p:extLst>
+      <p:ext uri="{BB962C8B-B14F-4D97-AF65-F5344CB8AC3E}">
+        <p14:creationId xmlns:p14="http://schemas.microsoft.com/office/powerpoint/2010/main" val="1046377433"/>
+      </p:ext>
+    </p:extLst>
+  </p:cSld>
+  <p:clrMapOvr>
+    <a:masterClrMapping/>
+  </p:clrMapOvr>
+</p:notes>
+</file>
+
+<file path=ppt/notesSlides/notesSlide6.xml><?xml version="1.0" encoding="utf-8"?>
+<p:notes xmlns:a="http://schemas.openxmlformats.org/drawingml/2006/main" xmlns:r="http://schemas.openxmlformats.org/officeDocument/2006/relationships" xmlns:p="http://schemas.openxmlformats.org/presentationml/2006/main">
+  <p:cSld>
+    <p:spTree>
+      <p:nvGrpSpPr>
+        <p:cNvPr id="1" name=""/>
+        <p:cNvGrpSpPr/>
+        <p:nvPr/>
+      </p:nvGrpSpPr>
+      <p:grpSpPr>
+        <a:xfrm>
+          <a:off x="0" y="0"/>
+          <a:ext cx="0" cy="0"/>
+          <a:chOff x="0" y="0"/>
+          <a:chExt cx="0" cy="0"/>
+        </a:xfrm>
+      </p:grpSpPr>
+      <p:sp>
+        <p:nvSpPr>
+          <p:cNvPr id="2" name="Slide Image Placeholder 1"/>
+          <p:cNvSpPr>
+            <a:spLocks noGrp="1" noRot="1" noChangeAspect="1"/>
+          </p:cNvSpPr>
+          <p:nvPr>
+            <p:ph type="sldImg"/>
+          </p:nvPr>
+        </p:nvSpPr>
+        <p:spPr/>
+      </p:sp>
+      <p:sp>
+        <p:nvSpPr>
+          <p:cNvPr id="3" name="Notes Placeholder 2"/>
+          <p:cNvSpPr>
+            <a:spLocks noGrp="1"/>
+          </p:cNvSpPr>
+          <p:nvPr>
+            <p:ph type="body" idx="1"/>
+          </p:nvPr>
+        </p:nvSpPr>
+        <p:spPr/>
+        <p:txBody>
+          <a:bodyPr/>
+          <a:lstStyle/>
+          <a:p>
+            <a:endParaRPr lang="en-US" dirty="0"/>
+          </a:p>
+        </p:txBody>
+      </p:sp>
+      <p:sp>
+        <p:nvSpPr>
+          <p:cNvPr id="4" name="Slide Number Placeholder 3"/>
+          <p:cNvSpPr>
+            <a:spLocks noGrp="1"/>
+          </p:cNvSpPr>
+          <p:nvPr>
+            <p:ph type="sldNum" sz="quarter" idx="5"/>
+          </p:nvPr>
+        </p:nvSpPr>
+        <p:spPr/>
+        <p:txBody>
+          <a:bodyPr/>
+          <a:lstStyle/>
+          <a:p>
+            <a:fld id="{33A6F4BA-D916-1F4A-A36F-1BFB60425551}" type="slidenum">
+              <a:rPr lang="en-US" smtClean="0"/>
+              <a:t>8</a:t>
+            </a:fld>
+            <a:endParaRPr lang="en-US"/>
+          </a:p>
+        </p:txBody>
+      </p:sp>
+    </p:spTree>
+    <p:extLst>
+      <p:ext uri="{BB962C8B-B14F-4D97-AF65-F5344CB8AC3E}">
+        <p14:creationId xmlns:p14="http://schemas.microsoft.com/office/powerpoint/2010/main" val="4058047063"/>
+      </p:ext>
+    </p:extLst>
+  </p:cSld>
+  <p:clrMapOvr>
+    <a:masterClrMapping/>
+  </p:clrMapOvr>
+</p:notes>
+</file>
+
+<file path=ppt/notesSlides/notesSlide7.xml><?xml version="1.0" encoding="utf-8"?>
+<p:notes xmlns:a="http://schemas.openxmlformats.org/drawingml/2006/main" xmlns:r="http://schemas.openxmlformats.org/officeDocument/2006/relationships" xmlns:p="http://schemas.openxmlformats.org/presentationml/2006/main">
+  <p:cSld>
+    <p:spTree>
+      <p:nvGrpSpPr>
+        <p:cNvPr id="1" name=""/>
+        <p:cNvGrpSpPr/>
+        <p:nvPr/>
+      </p:nvGrpSpPr>
+      <p:grpSpPr>
+        <a:xfrm>
+          <a:off x="0" y="0"/>
+          <a:ext cx="0" cy="0"/>
+          <a:chOff x="0" y="0"/>
+          <a:chExt cx="0" cy="0"/>
+        </a:xfrm>
+      </p:grpSpPr>
+      <p:sp>
+        <p:nvSpPr>
+          <p:cNvPr id="2" name="Slide Image Placeholder 1"/>
+          <p:cNvSpPr>
+            <a:spLocks noGrp="1" noRot="1" noChangeAspect="1"/>
+          </p:cNvSpPr>
+          <p:nvPr>
+            <p:ph type="sldImg"/>
+          </p:nvPr>
+        </p:nvSpPr>
+        <p:spPr/>
+      </p:sp>
+      <p:sp>
+        <p:nvSpPr>
+          <p:cNvPr id="3" name="Notes Placeholder 2"/>
+          <p:cNvSpPr>
+            <a:spLocks noGrp="1"/>
+          </p:cNvSpPr>
+          <p:nvPr>
+            <p:ph type="body" idx="1"/>
+          </p:nvPr>
+        </p:nvSpPr>
+        <p:spPr/>
+        <p:txBody>
+          <a:bodyPr/>
+          <a:lstStyle/>
+          <a:p>
+            <a:endParaRPr lang="en-US" b="0" dirty="0"/>
+          </a:p>
+        </p:txBody>
+      </p:sp>
+      <p:sp>
+        <p:nvSpPr>
+          <p:cNvPr id="4" name="Slide Number Placeholder 3"/>
+          <p:cNvSpPr>
+            <a:spLocks noGrp="1"/>
+          </p:cNvSpPr>
+          <p:nvPr>
+            <p:ph type="sldNum" sz="quarter" idx="5"/>
+          </p:nvPr>
+        </p:nvSpPr>
+        <p:spPr/>
+        <p:txBody>
+          <a:bodyPr/>
+          <a:lstStyle/>
+          <a:p>
+            <a:fld id="{33A6F4BA-D916-1F4A-A36F-1BFB60425551}" type="slidenum">
+              <a:rPr lang="en-US" smtClean="0"/>
+              <a:t>9</a:t>
             </a:fld>
             <a:endParaRPr lang="en-US"/>
           </a:p>
@@ -1009,6 +1359,90 @@
     <p:extLst>
       <p:ext uri="{BB962C8B-B14F-4D97-AF65-F5344CB8AC3E}">
         <p14:creationId xmlns:p14="http://schemas.microsoft.com/office/powerpoint/2010/main" val="3630716072"/>
+      </p:ext>
+    </p:extLst>
+  </p:cSld>
+  <p:clrMapOvr>
+    <a:masterClrMapping/>
+  </p:clrMapOvr>
+</p:notes>
+</file>
+
+<file path=ppt/notesSlides/notesSlide8.xml><?xml version="1.0" encoding="utf-8"?>
+<p:notes xmlns:a="http://schemas.openxmlformats.org/drawingml/2006/main" xmlns:r="http://schemas.openxmlformats.org/officeDocument/2006/relationships" xmlns:p="http://schemas.openxmlformats.org/presentationml/2006/main">
+  <p:cSld>
+    <p:spTree>
+      <p:nvGrpSpPr>
+        <p:cNvPr id="1" name=""/>
+        <p:cNvGrpSpPr/>
+        <p:nvPr/>
+      </p:nvGrpSpPr>
+      <p:grpSpPr>
+        <a:xfrm>
+          <a:off x="0" y="0"/>
+          <a:ext cx="0" cy="0"/>
+          <a:chOff x="0" y="0"/>
+          <a:chExt cx="0" cy="0"/>
+        </a:xfrm>
+      </p:grpSpPr>
+      <p:sp>
+        <p:nvSpPr>
+          <p:cNvPr id="2" name="Slide Image Placeholder 1"/>
+          <p:cNvSpPr>
+            <a:spLocks noGrp="1" noRot="1" noChangeAspect="1"/>
+          </p:cNvSpPr>
+          <p:nvPr>
+            <p:ph type="sldImg"/>
+          </p:nvPr>
+        </p:nvSpPr>
+        <p:spPr/>
+      </p:sp>
+      <p:sp>
+        <p:nvSpPr>
+          <p:cNvPr id="3" name="Notes Placeholder 2"/>
+          <p:cNvSpPr>
+            <a:spLocks noGrp="1"/>
+          </p:cNvSpPr>
+          <p:nvPr>
+            <p:ph type="body" idx="1"/>
+          </p:nvPr>
+        </p:nvSpPr>
+        <p:spPr/>
+        <p:txBody>
+          <a:bodyPr/>
+          <a:lstStyle/>
+          <a:p>
+            <a:endParaRPr lang="en-US" dirty="0"/>
+          </a:p>
+        </p:txBody>
+      </p:sp>
+      <p:sp>
+        <p:nvSpPr>
+          <p:cNvPr id="4" name="Slide Number Placeholder 3"/>
+          <p:cNvSpPr>
+            <a:spLocks noGrp="1"/>
+          </p:cNvSpPr>
+          <p:nvPr>
+            <p:ph type="sldNum" sz="quarter" idx="5"/>
+          </p:nvPr>
+        </p:nvSpPr>
+        <p:spPr/>
+        <p:txBody>
+          <a:bodyPr/>
+          <a:lstStyle/>
+          <a:p>
+            <a:fld id="{33A6F4BA-D916-1F4A-A36F-1BFB60425551}" type="slidenum">
+              <a:rPr lang="en-US" smtClean="0"/>
+              <a:t>10</a:t>
+            </a:fld>
+            <a:endParaRPr lang="en-US"/>
+          </a:p>
+        </p:txBody>
+      </p:sp>
+    </p:spTree>
+    <p:extLst>
+      <p:ext uri="{BB962C8B-B14F-4D97-AF65-F5344CB8AC3E}">
+        <p14:creationId xmlns:p14="http://schemas.microsoft.com/office/powerpoint/2010/main" val="3604913162"/>
       </p:ext>
     </p:extLst>
   </p:cSld>
@@ -1165,7 +1599,7 @@
           <a:p>
             <a:fld id="{E4AA6281-37A2-A840-978F-FC9CB7993506}" type="datetimeFigureOut">
               <a:rPr lang="en-US" smtClean="0"/>
-              <a:t>2/1/24</a:t>
+              <a:t>2/19/24</a:t>
             </a:fld>
             <a:endParaRPr lang="en-US"/>
           </a:p>
@@ -1363,7 +1797,7 @@
           <a:p>
             <a:fld id="{E4AA6281-37A2-A840-978F-FC9CB7993506}" type="datetimeFigureOut">
               <a:rPr lang="en-US" smtClean="0"/>
-              <a:t>2/1/24</a:t>
+              <a:t>2/19/24</a:t>
             </a:fld>
             <a:endParaRPr lang="en-US"/>
           </a:p>
@@ -1571,7 +2005,7 @@
           <a:p>
             <a:fld id="{E4AA6281-37A2-A840-978F-FC9CB7993506}" type="datetimeFigureOut">
               <a:rPr lang="en-US" smtClean="0"/>
-              <a:t>2/1/24</a:t>
+              <a:t>2/19/24</a:t>
             </a:fld>
             <a:endParaRPr lang="en-US"/>
           </a:p>
@@ -1769,7 +2203,7 @@
           <a:p>
             <a:fld id="{E4AA6281-37A2-A840-978F-FC9CB7993506}" type="datetimeFigureOut">
               <a:rPr lang="en-US" smtClean="0"/>
-              <a:t>2/1/24</a:t>
+              <a:t>2/19/24</a:t>
             </a:fld>
             <a:endParaRPr lang="en-US"/>
           </a:p>
@@ -2044,7 +2478,7 @@
           <a:p>
             <a:fld id="{E4AA6281-37A2-A840-978F-FC9CB7993506}" type="datetimeFigureOut">
               <a:rPr lang="en-US" smtClean="0"/>
-              <a:t>2/1/24</a:t>
+              <a:t>2/19/24</a:t>
             </a:fld>
             <a:endParaRPr lang="en-US"/>
           </a:p>
@@ -2309,7 +2743,7 @@
           <a:p>
             <a:fld id="{E4AA6281-37A2-A840-978F-FC9CB7993506}" type="datetimeFigureOut">
               <a:rPr lang="en-US" smtClean="0"/>
-              <a:t>2/1/24</a:t>
+              <a:t>2/19/24</a:t>
             </a:fld>
             <a:endParaRPr lang="en-US"/>
           </a:p>
@@ -2721,7 +3155,7 @@
           <a:p>
             <a:fld id="{E4AA6281-37A2-A840-978F-FC9CB7993506}" type="datetimeFigureOut">
               <a:rPr lang="en-US" smtClean="0"/>
-              <a:t>2/1/24</a:t>
+              <a:t>2/19/24</a:t>
             </a:fld>
             <a:endParaRPr lang="en-US"/>
           </a:p>
@@ -2862,7 +3296,7 @@
           <a:p>
             <a:fld id="{E4AA6281-37A2-A840-978F-FC9CB7993506}" type="datetimeFigureOut">
               <a:rPr lang="en-US" smtClean="0"/>
-              <a:t>2/1/24</a:t>
+              <a:t>2/19/24</a:t>
             </a:fld>
             <a:endParaRPr lang="en-US"/>
           </a:p>
@@ -2975,7 +3409,7 @@
           <a:p>
             <a:fld id="{E4AA6281-37A2-A840-978F-FC9CB7993506}" type="datetimeFigureOut">
               <a:rPr lang="en-US" smtClean="0"/>
-              <a:t>2/1/24</a:t>
+              <a:t>2/19/24</a:t>
             </a:fld>
             <a:endParaRPr lang="en-US"/>
           </a:p>
@@ -3286,7 +3720,7 @@
           <a:p>
             <a:fld id="{E4AA6281-37A2-A840-978F-FC9CB7993506}" type="datetimeFigureOut">
               <a:rPr lang="en-US" smtClean="0"/>
-              <a:t>2/1/24</a:t>
+              <a:t>2/19/24</a:t>
             </a:fld>
             <a:endParaRPr lang="en-US"/>
           </a:p>
@@ -3574,7 +4008,7 @@
           <a:p>
             <a:fld id="{E4AA6281-37A2-A840-978F-FC9CB7993506}" type="datetimeFigureOut">
               <a:rPr lang="en-US" smtClean="0"/>
-              <a:t>2/1/24</a:t>
+              <a:t>2/19/24</a:t>
             </a:fld>
             <a:endParaRPr lang="en-US"/>
           </a:p>
@@ -3815,7 +4249,7 @@
           <a:p>
             <a:fld id="{E4AA6281-37A2-A840-978F-FC9CB7993506}" type="datetimeFigureOut">
               <a:rPr lang="en-US" smtClean="0"/>
-              <a:t>2/1/24</a:t>
+              <a:t>2/19/24</a:t>
             </a:fld>
             <a:endParaRPr lang="en-US"/>
           </a:p>
@@ -4220,13 +4654,7 @@
   <p:cSld>
     <p:spTree>
       <p:nvGrpSpPr>
-        <p:cNvPr id="1" name="">
-          <a:extLst>
-            <a:ext uri="{FF2B5EF4-FFF2-40B4-BE49-F238E27FC236}">
-              <a16:creationId xmlns:a16="http://schemas.microsoft.com/office/drawing/2014/main" id="{6C87979F-9D59-B04B-45F6-66DB0C7F1691}"/>
-            </a:ext>
-          </a:extLst>
-        </p:cNvPr>
+        <p:cNvPr id="1" name=""/>
         <p:cNvGrpSpPr/>
         <p:nvPr/>
       </p:nvGrpSpPr>
@@ -4238,12 +4666,144 @@
           <a:chExt cx="0" cy="0"/>
         </a:xfrm>
       </p:grpSpPr>
+      <p:sp>
+        <p:nvSpPr>
+          <p:cNvPr id="2" name="Title 1">
+            <a:extLst>
+              <a:ext uri="{FF2B5EF4-FFF2-40B4-BE49-F238E27FC236}">
+                <a16:creationId xmlns:a16="http://schemas.microsoft.com/office/drawing/2014/main" id="{F17882E3-5334-C77A-FC4A-0343F93A011D}"/>
+              </a:ext>
+            </a:extLst>
+          </p:cNvPr>
+          <p:cNvSpPr>
+            <a:spLocks noGrp="1"/>
+          </p:cNvSpPr>
+          <p:nvPr>
+            <p:ph type="title"/>
+          </p:nvPr>
+        </p:nvSpPr>
+        <p:spPr/>
+        <p:txBody>
+          <a:bodyPr/>
+          <a:lstStyle/>
+          <a:p>
+            <a:r>
+              <a:rPr lang="en-US" dirty="0"/>
+              <a:t>Chosen Set-Up</a:t>
+            </a:r>
+          </a:p>
+        </p:txBody>
+      </p:sp>
+      <p:sp>
+        <p:nvSpPr>
+          <p:cNvPr id="3" name="Text Placeholder 2">
+            <a:extLst>
+              <a:ext uri="{FF2B5EF4-FFF2-40B4-BE49-F238E27FC236}">
+                <a16:creationId xmlns:a16="http://schemas.microsoft.com/office/drawing/2014/main" id="{CD113DD6-5362-DB45-5A30-F9648E83A227}"/>
+              </a:ext>
+            </a:extLst>
+          </p:cNvPr>
+          <p:cNvSpPr>
+            <a:spLocks noGrp="1"/>
+          </p:cNvSpPr>
+          <p:nvPr>
+            <p:ph type="body" idx="1"/>
+          </p:nvPr>
+        </p:nvSpPr>
+        <p:spPr/>
+        <p:txBody>
+          <a:bodyPr/>
+          <a:lstStyle/>
+          <a:p>
+            <a:endParaRPr lang="en-US"/>
+          </a:p>
+        </p:txBody>
+      </p:sp>
+    </p:spTree>
+    <p:extLst>
+      <p:ext uri="{BB962C8B-B14F-4D97-AF65-F5344CB8AC3E}">
+        <p14:creationId xmlns:p14="http://schemas.microsoft.com/office/powerpoint/2010/main" val="2241935385"/>
+      </p:ext>
+    </p:extLst>
+  </p:cSld>
+  <p:clrMapOvr>
+    <a:masterClrMapping/>
+  </p:clrMapOvr>
+</p:sld>
+</file>
+
+<file path=ppt/slides/slide10.xml><?xml version="1.0" encoding="utf-8"?>
+<p:sld xmlns:a="http://schemas.openxmlformats.org/drawingml/2006/main" xmlns:r="http://schemas.openxmlformats.org/officeDocument/2006/relationships" xmlns:p="http://schemas.openxmlformats.org/presentationml/2006/main">
+  <p:cSld>
+    <p:spTree>
+      <p:nvGrpSpPr>
+        <p:cNvPr id="1" name=""/>
+        <p:cNvGrpSpPr/>
+        <p:nvPr/>
+      </p:nvGrpSpPr>
+      <p:grpSpPr>
+        <a:xfrm>
+          <a:off x="0" y="0"/>
+          <a:ext cx="0" cy="0"/>
+          <a:chOff x="0" y="0"/>
+          <a:chExt cx="0" cy="0"/>
+        </a:xfrm>
+      </p:grpSpPr>
+      <p:sp>
+        <p:nvSpPr>
+          <p:cNvPr id="2" name="Right Arrow 1">
+            <a:extLst>
+              <a:ext uri="{FF2B5EF4-FFF2-40B4-BE49-F238E27FC236}">
+                <a16:creationId xmlns:a16="http://schemas.microsoft.com/office/drawing/2014/main" id="{BF6B5D11-916A-3F50-A527-0F29891CE9D4}"/>
+              </a:ext>
+            </a:extLst>
+          </p:cNvPr>
+          <p:cNvSpPr/>
+          <p:nvPr/>
+        </p:nvSpPr>
+        <p:spPr>
+          <a:xfrm>
+            <a:off x="5554134" y="2988734"/>
+            <a:ext cx="1439333" cy="880533"/>
+          </a:xfrm>
+          <a:prstGeom prst="rightArrow">
+            <a:avLst>
+              <a:gd name="adj1" fmla="val 23077"/>
+              <a:gd name="adj2" fmla="val 50000"/>
+            </a:avLst>
+          </a:prstGeom>
+        </p:spPr>
+        <p:style>
+          <a:lnRef idx="2">
+            <a:schemeClr val="dk1">
+              <a:shade val="15000"/>
+            </a:schemeClr>
+          </a:lnRef>
+          <a:fillRef idx="1">
+            <a:schemeClr val="dk1"/>
+          </a:fillRef>
+          <a:effectRef idx="0">
+            <a:schemeClr val="dk1"/>
+          </a:effectRef>
+          <a:fontRef idx="minor">
+            <a:schemeClr val="lt1"/>
+          </a:fontRef>
+        </p:style>
+        <p:txBody>
+          <a:bodyPr rtlCol="0" anchor="ctr"/>
+          <a:lstStyle/>
+          <a:p>
+            <a:pPr algn="ctr"/>
+            <a:endParaRPr lang="en-US"/>
+          </a:p>
+        </p:txBody>
+      </p:sp>
       <p:pic>
         <p:nvPicPr>
-          <p:cNvPr id="6" name="Picture 5">
-            <a:extLst>
-              <a:ext uri="{FF2B5EF4-FFF2-40B4-BE49-F238E27FC236}">
-                <a16:creationId xmlns:a16="http://schemas.microsoft.com/office/drawing/2014/main" id="{6F9139B5-D727-C037-757F-294FAC654687}"/>
+          <p:cNvPr id="3" name="Picture 2">
+            <a:extLst>
+              <a:ext uri="{FF2B5EF4-FFF2-40B4-BE49-F238E27FC236}">
+                <a16:creationId xmlns:a16="http://schemas.microsoft.com/office/drawing/2014/main" id="{F738BC2F-1D02-4430-824C-80CF92656AA3}"/>
               </a:ext>
             </a:extLst>
           </p:cNvPr>
@@ -4260,7 +4820,7 @@
         </p:blipFill>
         <p:spPr>
           <a:xfrm>
-            <a:off x="4038600" y="0"/>
+            <a:off x="787400" y="1371600"/>
             <a:ext cx="4114800" cy="4114800"/>
           </a:xfrm>
           <a:prstGeom prst="rect">
@@ -4270,10 +4830,10 @@
       </p:pic>
       <p:pic>
         <p:nvPicPr>
-          <p:cNvPr id="14" name="Picture 13">
-            <a:extLst>
-              <a:ext uri="{FF2B5EF4-FFF2-40B4-BE49-F238E27FC236}">
-                <a16:creationId xmlns:a16="http://schemas.microsoft.com/office/drawing/2014/main" id="{F5A89E68-7085-FED1-8FA7-17696638728B}"/>
+          <p:cNvPr id="4" name="Picture 3">
+            <a:extLst>
+              <a:ext uri="{FF2B5EF4-FFF2-40B4-BE49-F238E27FC236}">
+                <a16:creationId xmlns:a16="http://schemas.microsoft.com/office/drawing/2014/main" id="{80E1E341-121E-48AA-5C6C-C0369A88266A}"/>
               </a:ext>
             </a:extLst>
           </p:cNvPr>
@@ -4284,110 +4844,59 @@
         </p:nvPicPr>
         <p:blipFill>
           <a:blip r:embed="rId4"/>
-          <a:srcRect/>
-          <a:stretch/>
+          <a:stretch>
+            <a:fillRect/>
+          </a:stretch>
         </p:blipFill>
         <p:spPr>
           <a:xfrm>
-            <a:off x="1398685" y="4355111"/>
-            <a:ext cx="1828800" cy="2431914"/>
+            <a:off x="7497235" y="1371600"/>
+            <a:ext cx="3094330" cy="4114800"/>
           </a:xfrm>
           <a:prstGeom prst="rect">
             <a:avLst/>
           </a:prstGeom>
         </p:spPr>
       </p:pic>
-      <p:pic>
-        <p:nvPicPr>
-          <p:cNvPr id="16" name="Picture 15">
-            <a:extLst>
-              <a:ext uri="{FF2B5EF4-FFF2-40B4-BE49-F238E27FC236}">
-                <a16:creationId xmlns:a16="http://schemas.microsoft.com/office/drawing/2014/main" id="{B10F28AF-E2C1-6506-8DB7-84B7E14C16B6}"/>
-              </a:ext>
-            </a:extLst>
-          </p:cNvPr>
-          <p:cNvPicPr>
-            <a:picLocks noChangeAspect="1"/>
-          </p:cNvPicPr>
+      <p:sp>
+        <p:nvSpPr>
+          <p:cNvPr id="5" name="TextBox 4">
+            <a:extLst>
+              <a:ext uri="{FF2B5EF4-FFF2-40B4-BE49-F238E27FC236}">
+                <a16:creationId xmlns:a16="http://schemas.microsoft.com/office/drawing/2014/main" id="{F10A8C79-A177-A26E-2D80-5F202A62E254}"/>
+              </a:ext>
+            </a:extLst>
+          </p:cNvPr>
+          <p:cNvSpPr txBox="1"/>
           <p:nvPr/>
-        </p:nvPicPr>
-        <p:blipFill>
-          <a:blip r:embed="rId5"/>
-          <a:srcRect/>
-          <a:stretch/>
-        </p:blipFill>
+        </p:nvSpPr>
         <p:spPr>
           <a:xfrm>
-            <a:off x="4050448" y="4355111"/>
-            <a:ext cx="1828800" cy="2431914"/>
+            <a:off x="7179733" y="948267"/>
+            <a:ext cx="2323778" cy="369332"/>
           </a:xfrm>
           <a:prstGeom prst="rect">
             <a:avLst/>
           </a:prstGeom>
+          <a:noFill/>
         </p:spPr>
-      </p:pic>
-      <p:pic>
-        <p:nvPicPr>
-          <p:cNvPr id="41" name="Picture 40">
-            <a:extLst>
-              <a:ext uri="{FF2B5EF4-FFF2-40B4-BE49-F238E27FC236}">
-                <a16:creationId xmlns:a16="http://schemas.microsoft.com/office/drawing/2014/main" id="{EE16CC29-85D5-8560-5B1A-2C22365372FE}"/>
-              </a:ext>
-            </a:extLst>
-          </p:cNvPr>
-          <p:cNvPicPr>
-            <a:picLocks noChangeAspect="1"/>
-          </p:cNvPicPr>
-          <p:nvPr/>
-        </p:nvPicPr>
-        <p:blipFill>
-          <a:blip r:embed="rId6"/>
-          <a:srcRect/>
-          <a:stretch/>
-        </p:blipFill>
-        <p:spPr>
-          <a:xfrm>
-            <a:off x="6312752" y="4355111"/>
-            <a:ext cx="1828800" cy="2431914"/>
-          </a:xfrm>
-          <a:prstGeom prst="rect">
-            <a:avLst/>
-          </a:prstGeom>
-        </p:spPr>
-      </p:pic>
-      <p:pic>
-        <p:nvPicPr>
-          <p:cNvPr id="42" name="Picture 41">
-            <a:extLst>
-              <a:ext uri="{FF2B5EF4-FFF2-40B4-BE49-F238E27FC236}">
-                <a16:creationId xmlns:a16="http://schemas.microsoft.com/office/drawing/2014/main" id="{D88B7F7B-527F-073F-DCED-B87B15DF19AA}"/>
-              </a:ext>
-            </a:extLst>
-          </p:cNvPr>
-          <p:cNvPicPr>
-            <a:picLocks noChangeAspect="1"/>
-          </p:cNvPicPr>
-          <p:nvPr/>
-        </p:nvPicPr>
-        <p:blipFill>
-          <a:blip r:embed="rId7"/>
-          <a:srcRect/>
-          <a:stretch/>
-        </p:blipFill>
-        <p:spPr>
-          <a:xfrm>
-            <a:off x="8981448" y="4355111"/>
-            <a:ext cx="1828800" cy="2431914"/>
-          </a:xfrm>
-          <a:prstGeom prst="rect">
-            <a:avLst/>
-          </a:prstGeom>
-        </p:spPr>
-      </p:pic>
+        <p:txBody>
+          <a:bodyPr wrap="none" rtlCol="0">
+            <a:spAutoFit/>
+          </a:bodyPr>
+          <a:lstStyle/>
+          <a:p>
+            <a:r>
+              <a:rPr lang="en-US" dirty="0"/>
+              <a:t>”Wiggle hugged them”</a:t>
+            </a:r>
+          </a:p>
+        </p:txBody>
+      </p:sp>
     </p:spTree>
     <p:extLst>
       <p:ext uri="{BB962C8B-B14F-4D97-AF65-F5344CB8AC3E}">
-        <p14:creationId xmlns:p14="http://schemas.microsoft.com/office/powerpoint/2010/main" val="1961890544"/>
+        <p14:creationId xmlns:p14="http://schemas.microsoft.com/office/powerpoint/2010/main" val="1381386432"/>
       </p:ext>
     </p:extLst>
   </p:cSld>
@@ -4414,12 +4923,96 @@
           <a:chExt cx="0" cy="0"/>
         </a:xfrm>
       </p:grpSpPr>
+      <p:sp>
+        <p:nvSpPr>
+          <p:cNvPr id="5" name="Cross 4">
+            <a:extLst>
+              <a:ext uri="{FF2B5EF4-FFF2-40B4-BE49-F238E27FC236}">
+                <a16:creationId xmlns:a16="http://schemas.microsoft.com/office/drawing/2014/main" id="{3440AB1D-7BAF-40B5-A2F4-9CDE09D552CF}"/>
+              </a:ext>
+            </a:extLst>
+          </p:cNvPr>
+          <p:cNvSpPr/>
+          <p:nvPr/>
+        </p:nvSpPr>
+        <p:spPr>
+          <a:xfrm>
+            <a:off x="5638800" y="2971800"/>
+            <a:ext cx="914400" cy="914400"/>
+          </a:xfrm>
+          <a:prstGeom prst="plus">
+            <a:avLst>
+              <a:gd name="adj" fmla="val 41627"/>
+            </a:avLst>
+          </a:prstGeom>
+        </p:spPr>
+        <p:style>
+          <a:lnRef idx="2">
+            <a:schemeClr val="dk1">
+              <a:shade val="15000"/>
+            </a:schemeClr>
+          </a:lnRef>
+          <a:fillRef idx="1">
+            <a:schemeClr val="dk1"/>
+          </a:fillRef>
+          <a:effectRef idx="0">
+            <a:schemeClr val="dk1"/>
+          </a:effectRef>
+          <a:fontRef idx="minor">
+            <a:schemeClr val="lt1"/>
+          </a:fontRef>
+        </p:style>
+        <p:txBody>
+          <a:bodyPr rtlCol="0" anchor="ctr"/>
+          <a:lstStyle/>
+          <a:p>
+            <a:pPr algn="ctr"/>
+            <a:endParaRPr lang="en-US"/>
+          </a:p>
+        </p:txBody>
+      </p:sp>
+    </p:spTree>
+    <p:extLst>
+      <p:ext uri="{BB962C8B-B14F-4D97-AF65-F5344CB8AC3E}">
+        <p14:creationId xmlns:p14="http://schemas.microsoft.com/office/powerpoint/2010/main" val="2746603673"/>
+      </p:ext>
+    </p:extLst>
+  </p:cSld>
+  <p:clrMapOvr>
+    <a:masterClrMapping/>
+  </p:clrMapOvr>
+</p:sld>
+</file>
+
+<file path=ppt/slides/slide3.xml><?xml version="1.0" encoding="utf-8"?>
+<p:sld xmlns:a="http://schemas.openxmlformats.org/drawingml/2006/main" xmlns:r="http://schemas.openxmlformats.org/officeDocument/2006/relationships" xmlns:p="http://schemas.openxmlformats.org/presentationml/2006/main">
+  <p:cSld>
+    <p:spTree>
+      <p:nvGrpSpPr>
+        <p:cNvPr id="1" name="">
+          <a:extLst>
+            <a:ext uri="{FF2B5EF4-FFF2-40B4-BE49-F238E27FC236}">
+              <a16:creationId xmlns:a16="http://schemas.microsoft.com/office/drawing/2014/main" id="{6C87979F-9D59-B04B-45F6-66DB0C7F1691}"/>
+            </a:ext>
+          </a:extLst>
+        </p:cNvPr>
+        <p:cNvGrpSpPr/>
+        <p:nvPr/>
+      </p:nvGrpSpPr>
+      <p:grpSpPr>
+        <a:xfrm>
+          <a:off x="0" y="0"/>
+          <a:ext cx="0" cy="0"/>
+          <a:chOff x="0" y="0"/>
+          <a:chExt cx="0" cy="0"/>
+        </a:xfrm>
+      </p:grpSpPr>
       <p:pic>
         <p:nvPicPr>
           <p:cNvPr id="6" name="Picture 5">
             <a:extLst>
               <a:ext uri="{FF2B5EF4-FFF2-40B4-BE49-F238E27FC236}">
-                <a16:creationId xmlns:a16="http://schemas.microsoft.com/office/drawing/2014/main" id="{3150A428-3036-B8E5-9A50-9F861D3031D6}"/>
+                <a16:creationId xmlns:a16="http://schemas.microsoft.com/office/drawing/2014/main" id="{6F9139B5-D727-C037-757F-294FAC654687}"/>
               </a:ext>
             </a:extLst>
           </p:cNvPr>
@@ -4436,8 +5029,8 @@
         </p:blipFill>
         <p:spPr>
           <a:xfrm>
-            <a:off x="311511" y="886968"/>
-            <a:ext cx="5084064" cy="5084064"/>
+            <a:off x="4038600" y="0"/>
+            <a:ext cx="4114800" cy="4114800"/>
           </a:xfrm>
           <a:prstGeom prst="rect">
             <a:avLst/>
@@ -4446,10 +5039,272 @@
       </p:pic>
       <p:pic>
         <p:nvPicPr>
-          <p:cNvPr id="14" name="Picture 13" descr="A cartoon of a pink alien&#10;&#10;Description automatically generated">
-            <a:extLst>
-              <a:ext uri="{FF2B5EF4-FFF2-40B4-BE49-F238E27FC236}">
-                <a16:creationId xmlns:a16="http://schemas.microsoft.com/office/drawing/2014/main" id="{D26DE874-DAC3-0FBE-1E55-938CE19669EF}"/>
+          <p:cNvPr id="14" name="Picture 13">
+            <a:extLst>
+              <a:ext uri="{FF2B5EF4-FFF2-40B4-BE49-F238E27FC236}">
+                <a16:creationId xmlns:a16="http://schemas.microsoft.com/office/drawing/2014/main" id="{F5A89E68-7085-FED1-8FA7-17696638728B}"/>
+              </a:ext>
+            </a:extLst>
+          </p:cNvPr>
+          <p:cNvPicPr>
+            <a:picLocks noChangeAspect="1"/>
+          </p:cNvPicPr>
+          <p:nvPr/>
+        </p:nvPicPr>
+        <p:blipFill>
+          <a:blip r:embed="rId4"/>
+          <a:srcRect/>
+          <a:stretch/>
+        </p:blipFill>
+        <p:spPr>
+          <a:xfrm>
+            <a:off x="1398685" y="4355111"/>
+            <a:ext cx="1828800" cy="2431914"/>
+          </a:xfrm>
+          <a:prstGeom prst="rect">
+            <a:avLst/>
+          </a:prstGeom>
+        </p:spPr>
+      </p:pic>
+      <p:pic>
+        <p:nvPicPr>
+          <p:cNvPr id="16" name="Picture 15">
+            <a:extLst>
+              <a:ext uri="{FF2B5EF4-FFF2-40B4-BE49-F238E27FC236}">
+                <a16:creationId xmlns:a16="http://schemas.microsoft.com/office/drawing/2014/main" id="{B10F28AF-E2C1-6506-8DB7-84B7E14C16B6}"/>
+              </a:ext>
+            </a:extLst>
+          </p:cNvPr>
+          <p:cNvPicPr>
+            <a:picLocks noChangeAspect="1"/>
+          </p:cNvPicPr>
+          <p:nvPr/>
+        </p:nvPicPr>
+        <p:blipFill>
+          <a:blip r:embed="rId5"/>
+          <a:srcRect/>
+          <a:stretch/>
+        </p:blipFill>
+        <p:spPr>
+          <a:xfrm>
+            <a:off x="4050448" y="4355111"/>
+            <a:ext cx="1828800" cy="2431914"/>
+          </a:xfrm>
+          <a:prstGeom prst="rect">
+            <a:avLst/>
+          </a:prstGeom>
+        </p:spPr>
+      </p:pic>
+      <p:pic>
+        <p:nvPicPr>
+          <p:cNvPr id="41" name="Picture 40">
+            <a:extLst>
+              <a:ext uri="{FF2B5EF4-FFF2-40B4-BE49-F238E27FC236}">
+                <a16:creationId xmlns:a16="http://schemas.microsoft.com/office/drawing/2014/main" id="{EE16CC29-85D5-8560-5B1A-2C22365372FE}"/>
+              </a:ext>
+            </a:extLst>
+          </p:cNvPr>
+          <p:cNvPicPr>
+            <a:picLocks noChangeAspect="1"/>
+          </p:cNvPicPr>
+          <p:nvPr/>
+        </p:nvPicPr>
+        <p:blipFill>
+          <a:blip r:embed="rId6"/>
+          <a:srcRect/>
+          <a:stretch/>
+        </p:blipFill>
+        <p:spPr>
+          <a:xfrm>
+            <a:off x="6312752" y="4355111"/>
+            <a:ext cx="1828800" cy="2431914"/>
+          </a:xfrm>
+          <a:prstGeom prst="rect">
+            <a:avLst/>
+          </a:prstGeom>
+        </p:spPr>
+      </p:pic>
+      <p:pic>
+        <p:nvPicPr>
+          <p:cNvPr id="42" name="Picture 41">
+            <a:extLst>
+              <a:ext uri="{FF2B5EF4-FFF2-40B4-BE49-F238E27FC236}">
+                <a16:creationId xmlns:a16="http://schemas.microsoft.com/office/drawing/2014/main" id="{D88B7F7B-527F-073F-DCED-B87B15DF19AA}"/>
+              </a:ext>
+            </a:extLst>
+          </p:cNvPr>
+          <p:cNvPicPr>
+            <a:picLocks noChangeAspect="1"/>
+          </p:cNvPicPr>
+          <p:nvPr/>
+        </p:nvPicPr>
+        <p:blipFill>
+          <a:blip r:embed="rId7"/>
+          <a:srcRect/>
+          <a:stretch/>
+        </p:blipFill>
+        <p:spPr>
+          <a:xfrm>
+            <a:off x="8981448" y="4355111"/>
+            <a:ext cx="1828800" cy="2431914"/>
+          </a:xfrm>
+          <a:prstGeom prst="rect">
+            <a:avLst/>
+          </a:prstGeom>
+        </p:spPr>
+      </p:pic>
+      <p:sp>
+        <p:nvSpPr>
+          <p:cNvPr id="2" name="TextBox 1">
+            <a:extLst>
+              <a:ext uri="{FF2B5EF4-FFF2-40B4-BE49-F238E27FC236}">
+                <a16:creationId xmlns:a16="http://schemas.microsoft.com/office/drawing/2014/main" id="{E4FE3754-0083-1149-BA72-D37EF4D7D192}"/>
+              </a:ext>
+            </a:extLst>
+          </p:cNvPr>
+          <p:cNvSpPr txBox="1"/>
+          <p:nvPr/>
+        </p:nvSpPr>
+        <p:spPr>
+          <a:xfrm>
+            <a:off x="8788399" y="931333"/>
+            <a:ext cx="2831224" cy="369332"/>
+          </a:xfrm>
+          <a:prstGeom prst="rect">
+            <a:avLst/>
+          </a:prstGeom>
+          <a:noFill/>
+        </p:spPr>
+        <p:txBody>
+          <a:bodyPr wrap="none" rtlCol="0">
+            <a:spAutoFit/>
+          </a:bodyPr>
+          <a:lstStyle/>
+          <a:p>
+            <a:r>
+              <a:rPr lang="en-US" dirty="0"/>
+              <a:t>“What will Wiggle do next?”</a:t>
+            </a:r>
+          </a:p>
+        </p:txBody>
+      </p:sp>
+    </p:spTree>
+    <p:extLst>
+      <p:ext uri="{BB962C8B-B14F-4D97-AF65-F5344CB8AC3E}">
+        <p14:creationId xmlns:p14="http://schemas.microsoft.com/office/powerpoint/2010/main" val="4113340905"/>
+      </p:ext>
+    </p:extLst>
+  </p:cSld>
+  <p:clrMapOvr>
+    <a:masterClrMapping/>
+  </p:clrMapOvr>
+</p:sld>
+</file>
+
+<file path=ppt/slides/slide4.xml><?xml version="1.0" encoding="utf-8"?>
+<p:sld xmlns:a="http://schemas.openxmlformats.org/drawingml/2006/main" xmlns:r="http://schemas.openxmlformats.org/officeDocument/2006/relationships" xmlns:p="http://schemas.openxmlformats.org/presentationml/2006/main">
+  <p:cSld>
+    <p:spTree>
+      <p:nvGrpSpPr>
+        <p:cNvPr id="1" name=""/>
+        <p:cNvGrpSpPr/>
+        <p:nvPr/>
+      </p:nvGrpSpPr>
+      <p:grpSpPr>
+        <a:xfrm>
+          <a:off x="0" y="0"/>
+          <a:ext cx="0" cy="0"/>
+          <a:chOff x="0" y="0"/>
+          <a:chExt cx="0" cy="0"/>
+        </a:xfrm>
+      </p:grpSpPr>
+      <p:sp>
+        <p:nvSpPr>
+          <p:cNvPr id="2" name="Right Arrow 1">
+            <a:extLst>
+              <a:ext uri="{FF2B5EF4-FFF2-40B4-BE49-F238E27FC236}">
+                <a16:creationId xmlns:a16="http://schemas.microsoft.com/office/drawing/2014/main" id="{BF6B5D11-916A-3F50-A527-0F29891CE9D4}"/>
+              </a:ext>
+            </a:extLst>
+          </p:cNvPr>
+          <p:cNvSpPr>
+            <a:spLocks noChangeAspect="1"/>
+          </p:cNvSpPr>
+          <p:nvPr/>
+        </p:nvSpPr>
+        <p:spPr>
+          <a:xfrm>
+            <a:off x="5554134" y="2988733"/>
+            <a:ext cx="1494693" cy="914400"/>
+          </a:xfrm>
+          <a:prstGeom prst="rightArrow">
+            <a:avLst>
+              <a:gd name="adj1" fmla="val 23077"/>
+              <a:gd name="adj2" fmla="val 50000"/>
+            </a:avLst>
+          </a:prstGeom>
+        </p:spPr>
+        <p:style>
+          <a:lnRef idx="2">
+            <a:schemeClr val="dk1">
+              <a:shade val="15000"/>
+            </a:schemeClr>
+          </a:lnRef>
+          <a:fillRef idx="1">
+            <a:schemeClr val="dk1"/>
+          </a:fillRef>
+          <a:effectRef idx="0">
+            <a:schemeClr val="dk1"/>
+          </a:effectRef>
+          <a:fontRef idx="minor">
+            <a:schemeClr val="lt1"/>
+          </a:fontRef>
+        </p:style>
+        <p:txBody>
+          <a:bodyPr rtlCol="0" anchor="ctr"/>
+          <a:lstStyle/>
+          <a:p>
+            <a:pPr algn="ctr"/>
+            <a:endParaRPr lang="en-US"/>
+          </a:p>
+        </p:txBody>
+      </p:sp>
+      <p:pic>
+        <p:nvPicPr>
+          <p:cNvPr id="3" name="Picture 2">
+            <a:extLst>
+              <a:ext uri="{FF2B5EF4-FFF2-40B4-BE49-F238E27FC236}">
+                <a16:creationId xmlns:a16="http://schemas.microsoft.com/office/drawing/2014/main" id="{F738BC2F-1D02-4430-824C-80CF92656AA3}"/>
+              </a:ext>
+            </a:extLst>
+          </p:cNvPr>
+          <p:cNvPicPr>
+            <a:picLocks noChangeAspect="1"/>
+          </p:cNvPicPr>
+          <p:nvPr/>
+        </p:nvPicPr>
+        <p:blipFill>
+          <a:blip r:embed="rId3"/>
+          <a:stretch>
+            <a:fillRect/>
+          </a:stretch>
+        </p:blipFill>
+        <p:spPr>
+          <a:xfrm>
+            <a:off x="787400" y="1371600"/>
+            <a:ext cx="4114800" cy="4114800"/>
+          </a:xfrm>
+          <a:prstGeom prst="rect">
+            <a:avLst/>
+          </a:prstGeom>
+        </p:spPr>
+      </p:pic>
+      <p:pic>
+        <p:nvPicPr>
+          <p:cNvPr id="4" name="Picture 3">
+            <a:extLst>
+              <a:ext uri="{FF2B5EF4-FFF2-40B4-BE49-F238E27FC236}">
+                <a16:creationId xmlns:a16="http://schemas.microsoft.com/office/drawing/2014/main" id="{80E1E341-121E-48AA-5C6C-C0369A88266A}"/>
               </a:ext>
             </a:extLst>
           </p:cNvPr>
@@ -4466,8 +5321,192 @@
         </p:blipFill>
         <p:spPr>
           <a:xfrm>
-            <a:off x="6867984" y="0"/>
-            <a:ext cx="2379726" cy="3172968"/>
+            <a:off x="7497235" y="1371600"/>
+            <a:ext cx="3094330" cy="4114800"/>
+          </a:xfrm>
+          <a:prstGeom prst="rect">
+            <a:avLst/>
+          </a:prstGeom>
+        </p:spPr>
+      </p:pic>
+      <p:sp>
+        <p:nvSpPr>
+          <p:cNvPr id="5" name="TextBox 4">
+            <a:extLst>
+              <a:ext uri="{FF2B5EF4-FFF2-40B4-BE49-F238E27FC236}">
+                <a16:creationId xmlns:a16="http://schemas.microsoft.com/office/drawing/2014/main" id="{F10A8C79-A177-A26E-2D80-5F202A62E254}"/>
+              </a:ext>
+            </a:extLst>
+          </p:cNvPr>
+          <p:cNvSpPr txBox="1"/>
+          <p:nvPr/>
+        </p:nvSpPr>
+        <p:spPr>
+          <a:xfrm>
+            <a:off x="7179733" y="948267"/>
+            <a:ext cx="2323778" cy="369332"/>
+          </a:xfrm>
+          <a:prstGeom prst="rect">
+            <a:avLst/>
+          </a:prstGeom>
+          <a:noFill/>
+        </p:spPr>
+        <p:txBody>
+          <a:bodyPr wrap="none" rtlCol="0">
+            <a:spAutoFit/>
+          </a:bodyPr>
+          <a:lstStyle/>
+          <a:p>
+            <a:r>
+              <a:rPr lang="en-US" dirty="0"/>
+              <a:t>”Wiggle hugged them”</a:t>
+            </a:r>
+          </a:p>
+        </p:txBody>
+      </p:sp>
+    </p:spTree>
+    <p:extLst>
+      <p:ext uri="{BB962C8B-B14F-4D97-AF65-F5344CB8AC3E}">
+        <p14:creationId xmlns:p14="http://schemas.microsoft.com/office/powerpoint/2010/main" val="2343141067"/>
+      </p:ext>
+    </p:extLst>
+  </p:cSld>
+  <p:clrMapOvr>
+    <a:masterClrMapping/>
+  </p:clrMapOvr>
+</p:sld>
+</file>
+
+<file path=ppt/slides/slide5.xml><?xml version="1.0" encoding="utf-8"?>
+<p:sld xmlns:a="http://schemas.openxmlformats.org/drawingml/2006/main" xmlns:r="http://schemas.openxmlformats.org/officeDocument/2006/relationships" xmlns:p="http://schemas.openxmlformats.org/presentationml/2006/main">
+  <p:cSld>
+    <p:spTree>
+      <p:nvGrpSpPr>
+        <p:cNvPr id="1" name=""/>
+        <p:cNvGrpSpPr/>
+        <p:nvPr/>
+      </p:nvGrpSpPr>
+      <p:grpSpPr>
+        <a:xfrm>
+          <a:off x="0" y="0"/>
+          <a:ext cx="0" cy="0"/>
+          <a:chOff x="0" y="0"/>
+          <a:chExt cx="0" cy="0"/>
+        </a:xfrm>
+      </p:grpSpPr>
+      <p:sp>
+        <p:nvSpPr>
+          <p:cNvPr id="2" name="Title 1">
+            <a:extLst>
+              <a:ext uri="{FF2B5EF4-FFF2-40B4-BE49-F238E27FC236}">
+                <a16:creationId xmlns:a16="http://schemas.microsoft.com/office/drawing/2014/main" id="{D69C05FB-87CE-7EA9-7F29-AC3604F79652}"/>
+              </a:ext>
+            </a:extLst>
+          </p:cNvPr>
+          <p:cNvSpPr>
+            <a:spLocks noGrp="1"/>
+          </p:cNvSpPr>
+          <p:nvPr>
+            <p:ph type="title"/>
+          </p:nvPr>
+        </p:nvSpPr>
+        <p:spPr/>
+        <p:txBody>
+          <a:bodyPr/>
+          <a:lstStyle/>
+          <a:p>
+            <a:r>
+              <a:rPr lang="en-US" dirty="0"/>
+              <a:t>Option 1: Based on current set-up</a:t>
+            </a:r>
+          </a:p>
+        </p:txBody>
+      </p:sp>
+      <p:sp>
+        <p:nvSpPr>
+          <p:cNvPr id="3" name="Text Placeholder 2">
+            <a:extLst>
+              <a:ext uri="{FF2B5EF4-FFF2-40B4-BE49-F238E27FC236}">
+                <a16:creationId xmlns:a16="http://schemas.microsoft.com/office/drawing/2014/main" id="{69CBCBD6-01C8-33D8-913F-8754669CFB44}"/>
+              </a:ext>
+            </a:extLst>
+          </p:cNvPr>
+          <p:cNvSpPr>
+            <a:spLocks noGrp="1"/>
+          </p:cNvSpPr>
+          <p:nvPr>
+            <p:ph type="body" idx="1"/>
+          </p:nvPr>
+        </p:nvSpPr>
+        <p:spPr/>
+        <p:txBody>
+          <a:bodyPr/>
+          <a:lstStyle/>
+          <a:p>
+            <a:endParaRPr lang="en-US" dirty="0"/>
+          </a:p>
+        </p:txBody>
+      </p:sp>
+    </p:spTree>
+    <p:extLst>
+      <p:ext uri="{BB962C8B-B14F-4D97-AF65-F5344CB8AC3E}">
+        <p14:creationId xmlns:p14="http://schemas.microsoft.com/office/powerpoint/2010/main" val="2536749394"/>
+      </p:ext>
+    </p:extLst>
+  </p:cSld>
+  <p:clrMapOvr>
+    <a:masterClrMapping/>
+  </p:clrMapOvr>
+</p:sld>
+</file>
+
+<file path=ppt/slides/slide6.xml><?xml version="1.0" encoding="utf-8"?>
+<p:sld xmlns:a="http://schemas.openxmlformats.org/drawingml/2006/main" xmlns:r="http://schemas.openxmlformats.org/officeDocument/2006/relationships" xmlns:p="http://schemas.openxmlformats.org/presentationml/2006/main">
+  <p:cSld>
+    <p:spTree>
+      <p:nvGrpSpPr>
+        <p:cNvPr id="1" name="">
+          <a:extLst>
+            <a:ext uri="{FF2B5EF4-FFF2-40B4-BE49-F238E27FC236}">
+              <a16:creationId xmlns:a16="http://schemas.microsoft.com/office/drawing/2014/main" id="{6C87979F-9D59-B04B-45F6-66DB0C7F1691}"/>
+            </a:ext>
+          </a:extLst>
+        </p:cNvPr>
+        <p:cNvGrpSpPr/>
+        <p:nvPr/>
+      </p:nvGrpSpPr>
+      <p:grpSpPr>
+        <a:xfrm>
+          <a:off x="0" y="0"/>
+          <a:ext cx="0" cy="0"/>
+          <a:chOff x="0" y="0"/>
+          <a:chExt cx="0" cy="0"/>
+        </a:xfrm>
+      </p:grpSpPr>
+      <p:pic>
+        <p:nvPicPr>
+          <p:cNvPr id="6" name="Picture 5">
+            <a:extLst>
+              <a:ext uri="{FF2B5EF4-FFF2-40B4-BE49-F238E27FC236}">
+                <a16:creationId xmlns:a16="http://schemas.microsoft.com/office/drawing/2014/main" id="{6F9139B5-D727-C037-757F-294FAC654687}"/>
+              </a:ext>
+            </a:extLst>
+          </p:cNvPr>
+          <p:cNvPicPr>
+            <a:picLocks noChangeAspect="1"/>
+          </p:cNvPicPr>
+          <p:nvPr/>
+        </p:nvPicPr>
+        <p:blipFill>
+          <a:blip r:embed="rId3"/>
+          <a:stretch>
+            <a:fillRect/>
+          </a:stretch>
+        </p:blipFill>
+        <p:spPr>
+          <a:xfrm>
+            <a:off x="4038600" y="0"/>
+            <a:ext cx="4114800" cy="4114800"/>
           </a:xfrm>
           <a:prstGeom prst="rect">
             <a:avLst/>
@@ -4476,10 +5515,39 @@
       </p:pic>
       <p:pic>
         <p:nvPicPr>
-          <p:cNvPr id="16" name="Picture 15" descr="A cartoon of a pink and blue creature&#10;&#10;Description automatically generated">
-            <a:extLst>
-              <a:ext uri="{FF2B5EF4-FFF2-40B4-BE49-F238E27FC236}">
-                <a16:creationId xmlns:a16="http://schemas.microsoft.com/office/drawing/2014/main" id="{39B18693-CB15-C3B5-13ED-52B77951848E}"/>
+          <p:cNvPr id="14" name="Picture 13">
+            <a:extLst>
+              <a:ext uri="{FF2B5EF4-FFF2-40B4-BE49-F238E27FC236}">
+                <a16:creationId xmlns:a16="http://schemas.microsoft.com/office/drawing/2014/main" id="{F5A89E68-7085-FED1-8FA7-17696638728B}"/>
+              </a:ext>
+            </a:extLst>
+          </p:cNvPr>
+          <p:cNvPicPr>
+            <a:picLocks noChangeAspect="1"/>
+          </p:cNvPicPr>
+          <p:nvPr/>
+        </p:nvPicPr>
+        <p:blipFill>
+          <a:blip r:embed="rId4"/>
+          <a:srcRect/>
+          <a:stretch/>
+        </p:blipFill>
+        <p:spPr>
+          <a:xfrm>
+            <a:off x="1398685" y="4355111"/>
+            <a:ext cx="1828800" cy="2431914"/>
+          </a:xfrm>
+          <a:prstGeom prst="rect">
+            <a:avLst/>
+          </a:prstGeom>
+        </p:spPr>
+      </p:pic>
+      <p:pic>
+        <p:nvPicPr>
+          <p:cNvPr id="16" name="Picture 15">
+            <a:extLst>
+              <a:ext uri="{FF2B5EF4-FFF2-40B4-BE49-F238E27FC236}">
+                <a16:creationId xmlns:a16="http://schemas.microsoft.com/office/drawing/2014/main" id="{B10F28AF-E2C1-6506-8DB7-84B7E14C16B6}"/>
               </a:ext>
             </a:extLst>
           </p:cNvPr>
@@ -4490,14 +5558,13 @@
         </p:nvPicPr>
         <p:blipFill>
           <a:blip r:embed="rId5"/>
-          <a:stretch>
-            <a:fillRect/>
-          </a:stretch>
+          <a:srcRect/>
+          <a:stretch/>
         </p:blipFill>
         <p:spPr>
           <a:xfrm>
-            <a:off x="9616877" y="0"/>
-            <a:ext cx="2379726" cy="3172968"/>
+            <a:off x="4050448" y="4355111"/>
+            <a:ext cx="1828800" cy="2431914"/>
           </a:xfrm>
           <a:prstGeom prst="rect">
             <a:avLst/>
@@ -4509,7 +5576,7 @@
           <p:cNvPr id="41" name="Picture 40">
             <a:extLst>
               <a:ext uri="{FF2B5EF4-FFF2-40B4-BE49-F238E27FC236}">
-                <a16:creationId xmlns:a16="http://schemas.microsoft.com/office/drawing/2014/main" id="{6F86DFBA-8D7D-B8C5-2EC5-25E92EC72F42}"/>
+                <a16:creationId xmlns:a16="http://schemas.microsoft.com/office/drawing/2014/main" id="{EE16CC29-85D5-8560-5B1A-2C22365372FE}"/>
               </a:ext>
             </a:extLst>
           </p:cNvPr>
@@ -4520,14 +5587,13 @@
         </p:nvPicPr>
         <p:blipFill>
           <a:blip r:embed="rId6"/>
-          <a:stretch>
-            <a:fillRect/>
-          </a:stretch>
+          <a:srcRect/>
+          <a:stretch/>
         </p:blipFill>
         <p:spPr>
           <a:xfrm>
-            <a:off x="6867984" y="3489478"/>
-            <a:ext cx="2379726" cy="3172968"/>
+            <a:off x="6312752" y="4355111"/>
+            <a:ext cx="1828800" cy="2431914"/>
           </a:xfrm>
           <a:prstGeom prst="rect">
             <a:avLst/>
@@ -4539,7 +5605,395 @@
           <p:cNvPr id="42" name="Picture 41">
             <a:extLst>
               <a:ext uri="{FF2B5EF4-FFF2-40B4-BE49-F238E27FC236}">
-                <a16:creationId xmlns:a16="http://schemas.microsoft.com/office/drawing/2014/main" id="{BAC84CE9-1CAF-4BBC-208B-890768DFE479}"/>
+                <a16:creationId xmlns:a16="http://schemas.microsoft.com/office/drawing/2014/main" id="{D88B7F7B-527F-073F-DCED-B87B15DF19AA}"/>
+              </a:ext>
+            </a:extLst>
+          </p:cNvPr>
+          <p:cNvPicPr>
+            <a:picLocks noChangeAspect="1"/>
+          </p:cNvPicPr>
+          <p:nvPr/>
+        </p:nvPicPr>
+        <p:blipFill>
+          <a:blip r:embed="rId7"/>
+          <a:srcRect/>
+          <a:stretch/>
+        </p:blipFill>
+        <p:spPr>
+          <a:xfrm>
+            <a:off x="8981448" y="4355111"/>
+            <a:ext cx="1828800" cy="2431914"/>
+          </a:xfrm>
+          <a:prstGeom prst="rect">
+            <a:avLst/>
+          </a:prstGeom>
+        </p:spPr>
+      </p:pic>
+      <p:sp>
+        <p:nvSpPr>
+          <p:cNvPr id="2" name="TextBox 1">
+            <a:extLst>
+              <a:ext uri="{FF2B5EF4-FFF2-40B4-BE49-F238E27FC236}">
+                <a16:creationId xmlns:a16="http://schemas.microsoft.com/office/drawing/2014/main" id="{E4FE3754-0083-1149-BA72-D37EF4D7D192}"/>
+              </a:ext>
+            </a:extLst>
+          </p:cNvPr>
+          <p:cNvSpPr txBox="1"/>
+          <p:nvPr/>
+        </p:nvSpPr>
+        <p:spPr>
+          <a:xfrm>
+            <a:off x="8788399" y="931333"/>
+            <a:ext cx="2831224" cy="369332"/>
+          </a:xfrm>
+          <a:prstGeom prst="rect">
+            <a:avLst/>
+          </a:prstGeom>
+          <a:noFill/>
+        </p:spPr>
+        <p:txBody>
+          <a:bodyPr wrap="none" rtlCol="0">
+            <a:spAutoFit/>
+          </a:bodyPr>
+          <a:lstStyle/>
+          <a:p>
+            <a:r>
+              <a:rPr lang="en-US" dirty="0"/>
+              <a:t>“What will Wiggle do next?”</a:t>
+            </a:r>
+          </a:p>
+        </p:txBody>
+      </p:sp>
+    </p:spTree>
+    <p:extLst>
+      <p:ext uri="{BB962C8B-B14F-4D97-AF65-F5344CB8AC3E}">
+        <p14:creationId xmlns:p14="http://schemas.microsoft.com/office/powerpoint/2010/main" val="1961890544"/>
+      </p:ext>
+    </p:extLst>
+  </p:cSld>
+  <p:clrMapOvr>
+    <a:masterClrMapping/>
+  </p:clrMapOvr>
+</p:sld>
+</file>
+
+<file path=ppt/slides/slide7.xml><?xml version="1.0" encoding="utf-8"?>
+<p:sld xmlns:a="http://schemas.openxmlformats.org/drawingml/2006/main" xmlns:r="http://schemas.openxmlformats.org/officeDocument/2006/relationships" xmlns:p="http://schemas.openxmlformats.org/presentationml/2006/main">
+  <p:cSld>
+    <p:spTree>
+      <p:nvGrpSpPr>
+        <p:cNvPr id="1" name=""/>
+        <p:cNvGrpSpPr/>
+        <p:nvPr/>
+      </p:nvGrpSpPr>
+      <p:grpSpPr>
+        <a:xfrm>
+          <a:off x="0" y="0"/>
+          <a:ext cx="0" cy="0"/>
+          <a:chOff x="0" y="0"/>
+          <a:chExt cx="0" cy="0"/>
+        </a:xfrm>
+      </p:grpSpPr>
+      <p:sp>
+        <p:nvSpPr>
+          <p:cNvPr id="2" name="TextBox 1">
+            <a:extLst>
+              <a:ext uri="{FF2B5EF4-FFF2-40B4-BE49-F238E27FC236}">
+                <a16:creationId xmlns:a16="http://schemas.microsoft.com/office/drawing/2014/main" id="{E1720205-BB3E-C295-539A-D003F8B4CAB9}"/>
+              </a:ext>
+            </a:extLst>
+          </p:cNvPr>
+          <p:cNvSpPr txBox="1"/>
+          <p:nvPr/>
+        </p:nvSpPr>
+        <p:spPr>
+          <a:xfrm>
+            <a:off x="8534400" y="575733"/>
+            <a:ext cx="2382640" cy="369332"/>
+          </a:xfrm>
+          <a:prstGeom prst="rect">
+            <a:avLst/>
+          </a:prstGeom>
+          <a:noFill/>
+        </p:spPr>
+        <p:txBody>
+          <a:bodyPr wrap="none" rtlCol="0">
+            <a:spAutoFit/>
+          </a:bodyPr>
+          <a:lstStyle/>
+          <a:p>
+            <a:r>
+              <a:rPr lang="en-US" dirty="0"/>
+              <a:t>“Wiggle hugged them.”</a:t>
+            </a:r>
+          </a:p>
+        </p:txBody>
+      </p:sp>
+      <p:pic>
+        <p:nvPicPr>
+          <p:cNvPr id="4" name="Picture 3">
+            <a:extLst>
+              <a:ext uri="{FF2B5EF4-FFF2-40B4-BE49-F238E27FC236}">
+                <a16:creationId xmlns:a16="http://schemas.microsoft.com/office/drawing/2014/main" id="{87905A87-AA4A-D9F5-B02C-42EDDD451315}"/>
+              </a:ext>
+            </a:extLst>
+          </p:cNvPr>
+          <p:cNvPicPr>
+            <a:picLocks noChangeAspect="1"/>
+          </p:cNvPicPr>
+          <p:nvPr/>
+        </p:nvPicPr>
+        <p:blipFill>
+          <a:blip r:embed="rId3"/>
+          <a:stretch>
+            <a:fillRect/>
+          </a:stretch>
+        </p:blipFill>
+        <p:spPr>
+          <a:xfrm>
+            <a:off x="4548835" y="0"/>
+            <a:ext cx="3094330" cy="4114800"/>
+          </a:xfrm>
+          <a:prstGeom prst="rect">
+            <a:avLst/>
+          </a:prstGeom>
+        </p:spPr>
+      </p:pic>
+    </p:spTree>
+    <p:extLst>
+      <p:ext uri="{BB962C8B-B14F-4D97-AF65-F5344CB8AC3E}">
+        <p14:creationId xmlns:p14="http://schemas.microsoft.com/office/powerpoint/2010/main" val="696755344"/>
+      </p:ext>
+    </p:extLst>
+  </p:cSld>
+  <p:clrMapOvr>
+    <a:masterClrMapping/>
+  </p:clrMapOvr>
+</p:sld>
+</file>
+
+<file path=ppt/slides/slide8.xml><?xml version="1.0" encoding="utf-8"?>
+<p:sld xmlns:a="http://schemas.openxmlformats.org/drawingml/2006/main" xmlns:r="http://schemas.openxmlformats.org/officeDocument/2006/relationships" xmlns:p="http://schemas.openxmlformats.org/presentationml/2006/main">
+  <p:cSld>
+    <p:spTree>
+      <p:nvGrpSpPr>
+        <p:cNvPr id="1" name=""/>
+        <p:cNvGrpSpPr/>
+        <p:nvPr/>
+      </p:nvGrpSpPr>
+      <p:grpSpPr>
+        <a:xfrm>
+          <a:off x="0" y="0"/>
+          <a:ext cx="0" cy="0"/>
+          <a:chOff x="0" y="0"/>
+          <a:chExt cx="0" cy="0"/>
+        </a:xfrm>
+      </p:grpSpPr>
+      <p:sp>
+        <p:nvSpPr>
+          <p:cNvPr id="2" name="Title 1">
+            <a:extLst>
+              <a:ext uri="{FF2B5EF4-FFF2-40B4-BE49-F238E27FC236}">
+                <a16:creationId xmlns:a16="http://schemas.microsoft.com/office/drawing/2014/main" id="{491F2E7F-CDF7-217D-73CF-593D21DC6E45}"/>
+              </a:ext>
+            </a:extLst>
+          </p:cNvPr>
+          <p:cNvSpPr>
+            <a:spLocks noGrp="1"/>
+          </p:cNvSpPr>
+          <p:nvPr>
+            <p:ph type="title"/>
+          </p:nvPr>
+        </p:nvSpPr>
+        <p:spPr/>
+        <p:txBody>
+          <a:bodyPr/>
+          <a:lstStyle/>
+          <a:p>
+            <a:r>
+              <a:rPr lang="en-US" dirty="0"/>
+              <a:t>Option 2: Alternate set-up</a:t>
+            </a:r>
+          </a:p>
+        </p:txBody>
+      </p:sp>
+      <p:sp>
+        <p:nvSpPr>
+          <p:cNvPr id="3" name="Text Placeholder 2">
+            <a:extLst>
+              <a:ext uri="{FF2B5EF4-FFF2-40B4-BE49-F238E27FC236}">
+                <a16:creationId xmlns:a16="http://schemas.microsoft.com/office/drawing/2014/main" id="{2CD461B9-9E2F-495C-2449-9A697770F807}"/>
+              </a:ext>
+            </a:extLst>
+          </p:cNvPr>
+          <p:cNvSpPr>
+            <a:spLocks noGrp="1"/>
+          </p:cNvSpPr>
+          <p:nvPr>
+            <p:ph type="body" idx="1"/>
+          </p:nvPr>
+        </p:nvSpPr>
+        <p:spPr/>
+        <p:txBody>
+          <a:bodyPr/>
+          <a:lstStyle/>
+          <a:p>
+            <a:endParaRPr lang="en-US"/>
+          </a:p>
+        </p:txBody>
+      </p:sp>
+    </p:spTree>
+    <p:extLst>
+      <p:ext uri="{BB962C8B-B14F-4D97-AF65-F5344CB8AC3E}">
+        <p14:creationId xmlns:p14="http://schemas.microsoft.com/office/powerpoint/2010/main" val="1716446395"/>
+      </p:ext>
+    </p:extLst>
+  </p:cSld>
+  <p:clrMapOvr>
+    <a:masterClrMapping/>
+  </p:clrMapOvr>
+</p:sld>
+</file>
+
+<file path=ppt/slides/slide9.xml><?xml version="1.0" encoding="utf-8"?>
+<p:sld xmlns:a="http://schemas.openxmlformats.org/drawingml/2006/main" xmlns:r="http://schemas.openxmlformats.org/officeDocument/2006/relationships" xmlns:p="http://schemas.openxmlformats.org/presentationml/2006/main">
+  <p:cSld>
+    <p:spTree>
+      <p:nvGrpSpPr>
+        <p:cNvPr id="1" name=""/>
+        <p:cNvGrpSpPr/>
+        <p:nvPr/>
+      </p:nvGrpSpPr>
+      <p:grpSpPr>
+        <a:xfrm>
+          <a:off x="0" y="0"/>
+          <a:ext cx="0" cy="0"/>
+          <a:chOff x="0" y="0"/>
+          <a:chExt cx="0" cy="0"/>
+        </a:xfrm>
+      </p:grpSpPr>
+      <p:pic>
+        <p:nvPicPr>
+          <p:cNvPr id="3" name="Picture 2">
+            <a:extLst>
+              <a:ext uri="{FF2B5EF4-FFF2-40B4-BE49-F238E27FC236}">
+                <a16:creationId xmlns:a16="http://schemas.microsoft.com/office/drawing/2014/main" id="{E3B8A95C-3623-4279-B7F8-522AFC6F6D05}"/>
+              </a:ext>
+            </a:extLst>
+          </p:cNvPr>
+          <p:cNvPicPr>
+            <a:picLocks noChangeAspect="1"/>
+          </p:cNvPicPr>
+          <p:nvPr/>
+        </p:nvPicPr>
+        <p:blipFill>
+          <a:blip r:embed="rId3"/>
+          <a:srcRect/>
+          <a:stretch/>
+        </p:blipFill>
+        <p:spPr>
+          <a:xfrm>
+            <a:off x="7208518" y="612843"/>
+            <a:ext cx="1828800" cy="2431914"/>
+          </a:xfrm>
+          <a:prstGeom prst="rect">
+            <a:avLst/>
+          </a:prstGeom>
+        </p:spPr>
+      </p:pic>
+      <p:pic>
+        <p:nvPicPr>
+          <p:cNvPr id="4" name="Picture 3">
+            <a:extLst>
+              <a:ext uri="{FF2B5EF4-FFF2-40B4-BE49-F238E27FC236}">
+                <a16:creationId xmlns:a16="http://schemas.microsoft.com/office/drawing/2014/main" id="{AB5D47C1-70A6-9D16-563A-4060B1632251}"/>
+              </a:ext>
+            </a:extLst>
+          </p:cNvPr>
+          <p:cNvPicPr>
+            <a:picLocks noChangeAspect="1"/>
+          </p:cNvPicPr>
+          <p:nvPr/>
+        </p:nvPicPr>
+        <p:blipFill>
+          <a:blip r:embed="rId4"/>
+          <a:srcRect/>
+          <a:stretch/>
+        </p:blipFill>
+        <p:spPr>
+          <a:xfrm>
+            <a:off x="9690948" y="612843"/>
+            <a:ext cx="1828800" cy="2431914"/>
+          </a:xfrm>
+          <a:prstGeom prst="rect">
+            <a:avLst/>
+          </a:prstGeom>
+        </p:spPr>
+      </p:pic>
+      <p:pic>
+        <p:nvPicPr>
+          <p:cNvPr id="5" name="Picture 4">
+            <a:extLst>
+              <a:ext uri="{FF2B5EF4-FFF2-40B4-BE49-F238E27FC236}">
+                <a16:creationId xmlns:a16="http://schemas.microsoft.com/office/drawing/2014/main" id="{3BFBCB3B-7AAA-89AE-9BB7-000CCDC69319}"/>
+              </a:ext>
+            </a:extLst>
+          </p:cNvPr>
+          <p:cNvPicPr>
+            <a:picLocks noChangeAspect="1"/>
+          </p:cNvPicPr>
+          <p:nvPr/>
+        </p:nvPicPr>
+        <p:blipFill>
+          <a:blip r:embed="rId5"/>
+          <a:srcRect/>
+          <a:stretch/>
+        </p:blipFill>
+        <p:spPr>
+          <a:xfrm>
+            <a:off x="7208518" y="3767667"/>
+            <a:ext cx="1828800" cy="2431914"/>
+          </a:xfrm>
+          <a:prstGeom prst="rect">
+            <a:avLst/>
+          </a:prstGeom>
+        </p:spPr>
+      </p:pic>
+      <p:pic>
+        <p:nvPicPr>
+          <p:cNvPr id="7" name="Picture 6">
+            <a:extLst>
+              <a:ext uri="{FF2B5EF4-FFF2-40B4-BE49-F238E27FC236}">
+                <a16:creationId xmlns:a16="http://schemas.microsoft.com/office/drawing/2014/main" id="{FF7FED16-1E1D-8C86-F066-D3ADFEB3CA93}"/>
+              </a:ext>
+            </a:extLst>
+          </p:cNvPr>
+          <p:cNvPicPr>
+            <a:picLocks noChangeAspect="1"/>
+          </p:cNvPicPr>
+          <p:nvPr/>
+        </p:nvPicPr>
+        <p:blipFill>
+          <a:blip r:embed="rId6"/>
+          <a:srcRect/>
+          <a:stretch/>
+        </p:blipFill>
+        <p:spPr>
+          <a:xfrm>
+            <a:off x="9690948" y="3767667"/>
+            <a:ext cx="1828800" cy="2431914"/>
+          </a:xfrm>
+          <a:prstGeom prst="rect">
+            <a:avLst/>
+          </a:prstGeom>
+        </p:spPr>
+      </p:pic>
+      <p:pic>
+        <p:nvPicPr>
+          <p:cNvPr id="8" name="Picture 7">
+            <a:extLst>
+              <a:ext uri="{FF2B5EF4-FFF2-40B4-BE49-F238E27FC236}">
+                <a16:creationId xmlns:a16="http://schemas.microsoft.com/office/drawing/2014/main" id="{E0E37214-4460-11B8-9265-09C9341095FE}"/>
               </a:ext>
             </a:extLst>
           </p:cNvPr>
@@ -4556,8 +6010,8 @@
         </p:blipFill>
         <p:spPr>
           <a:xfrm>
-            <a:off x="9616877" y="3489478"/>
-            <a:ext cx="2379726" cy="3172968"/>
+            <a:off x="787400" y="1371600"/>
+            <a:ext cx="4114800" cy="4114800"/>
           </a:xfrm>
           <a:prstGeom prst="rect">
             <a:avLst/>
@@ -4566,10 +6020,45 @@
       </p:pic>
       <p:sp>
         <p:nvSpPr>
-          <p:cNvPr id="2" name="Right Arrow 1">
-            <a:extLst>
-              <a:ext uri="{FF2B5EF4-FFF2-40B4-BE49-F238E27FC236}">
-                <a16:creationId xmlns:a16="http://schemas.microsoft.com/office/drawing/2014/main" id="{01AB47C3-F7F8-126A-CCC7-E72AA8E0B97B}"/>
+          <p:cNvPr id="10" name="TextBox 9">
+            <a:extLst>
+              <a:ext uri="{FF2B5EF4-FFF2-40B4-BE49-F238E27FC236}">
+                <a16:creationId xmlns:a16="http://schemas.microsoft.com/office/drawing/2014/main" id="{90B8D4FD-31E6-A63D-5073-A90BA65C2B6B}"/>
+              </a:ext>
+            </a:extLst>
+          </p:cNvPr>
+          <p:cNvSpPr txBox="1"/>
+          <p:nvPr/>
+        </p:nvSpPr>
+        <p:spPr>
+          <a:xfrm>
+            <a:off x="321733" y="372533"/>
+            <a:ext cx="2831224" cy="369332"/>
+          </a:xfrm>
+          <a:prstGeom prst="rect">
+            <a:avLst/>
+          </a:prstGeom>
+          <a:noFill/>
+        </p:spPr>
+        <p:txBody>
+          <a:bodyPr wrap="none" rtlCol="0">
+            <a:spAutoFit/>
+          </a:bodyPr>
+          <a:lstStyle/>
+          <a:p>
+            <a:r>
+              <a:rPr lang="en-US" dirty="0"/>
+              <a:t>“What will Wiggle do next?”</a:t>
+            </a:r>
+          </a:p>
+        </p:txBody>
+      </p:sp>
+      <p:sp>
+        <p:nvSpPr>
+          <p:cNvPr id="12" name="Right Arrow 11">
+            <a:extLst>
+              <a:ext uri="{FF2B5EF4-FFF2-40B4-BE49-F238E27FC236}">
+                <a16:creationId xmlns:a16="http://schemas.microsoft.com/office/drawing/2014/main" id="{668B18F1-8F18-468E-41FE-55395C9AE14F}"/>
               </a:ext>
             </a:extLst>
           </p:cNvPr>
@@ -4578,8 +6067,8 @@
         </p:nvSpPr>
         <p:spPr>
           <a:xfrm>
-            <a:off x="5689600" y="3081868"/>
-            <a:ext cx="1083733" cy="880533"/>
+            <a:off x="5554134" y="2988734"/>
+            <a:ext cx="1439333" cy="880533"/>
           </a:xfrm>
           <a:prstGeom prst="rightArrow">
             <a:avLst>

</xml_diff>